<commit_message>
Added first draft of machine learning section.
</commit_message>
<xml_diff>
--- a/Poster.pptx
+++ b/Poster.pptx
@@ -801,6 +801,11 @@
         </p:txBody>
       </p:sp>
     </p:spTree>
+    <p:extLst>
+      <p:ext uri="{BB962C8B-B14F-4D97-AF65-F5344CB8AC3E}">
+        <p14:creationId xmlns:p14="http://schemas.microsoft.com/office/powerpoint/2010/main" val="728862081"/>
+      </p:ext>
+    </p:extLst>
   </p:cSld>
   <p:clrMapOvr>
     <a:masterClrMapping/>
@@ -6580,8 +6585,8 @@
           </p:txBody>
         </p:sp>
       </p:grpSp>
-      <mc:AlternateContent xmlns:mc="http://schemas.openxmlformats.org/markup-compatibility/2006">
-        <mc:Choice xmlns:a14="http://schemas.microsoft.com/office/drawing/2010/main" Requires="a14">
+      <mc:AlternateContent xmlns:mc="http://schemas.openxmlformats.org/markup-compatibility/2006" xmlns:a14="http://schemas.microsoft.com/office/drawing/2010/main">
+        <mc:Choice Requires="a14">
           <p:sp>
             <p:nvSpPr>
               <p:cNvPr id="1041" name="Text Box 74"/>
@@ -6624,18 +6629,7 @@
                     <a:ea typeface="+mj-ea"/>
                     <a:cs typeface="+mj-cs"/>
                   </a:rPr>
-                  <a:t>IMPROVEMENT: THERMAL </a:t>
-                </a:r>
-                <a:r>
-                  <a:rPr kumimoji="1" lang="en-US" sz="3800" u="sng" dirty="0" smtClean="0">
-                    <a:solidFill>
-                      <a:schemeClr val="bg1"/>
-                    </a:solidFill>
-                    <a:latin typeface="+mj-lt"/>
-                    <a:ea typeface="+mj-ea"/>
-                    <a:cs typeface="+mj-cs"/>
-                  </a:rPr>
-                  <a:t>IDENTIFICATION</a:t>
+                  <a:t>IMPROVEMENT: THERMAL IDENTIFICATION</a:t>
                 </a:r>
                 <a:endParaRPr kumimoji="1" lang="en-US" sz="3800" u="sng" dirty="0">
                   <a:solidFill>
@@ -6721,7 +6715,7 @@
             </p:txBody>
           </p:sp>
         </mc:Choice>
-        <mc:Fallback>
+        <mc:Fallback xmlns="">
           <p:sp>
             <p:nvSpPr>
               <p:cNvPr id="1041" name="Text Box 74"/>
@@ -7215,18 +7209,7 @@
                 <a:ea typeface="+mj-ea"/>
                 <a:cs typeface="+mj-cs"/>
               </a:rPr>
-              <a:t>RESULTS. As the glider flies a flight path gaining altitude, it collects and runs the last 45 seconds of data through Gaussian process regression predicting the vertical velocity in a 20-meter radius around the glider. Because it predicts a probability distribution, which provides a measure of uncertainty, this can be used in determining whether it is beneficial to latch onto a thermal. </a:t>
-            </a:r>
-            <a:r>
-              <a:rPr kumimoji="1" lang="en-US" sz="3200" dirty="0" smtClean="0">
-                <a:solidFill>
-                  <a:schemeClr val="bg1"/>
-                </a:solidFill>
-                <a:latin typeface="+mj-lt"/>
-                <a:ea typeface="+mj-ea"/>
-                <a:cs typeface="+mj-cs"/>
-              </a:rPr>
-              <a:t>The glider will start circling the point of the highest predicted vertical velocity if with 85 percent confidence this velocity is above a certain threshold. Figure 3 shows a test in simulation where the glider successfully found a thermal and has orbited it twice.</a:t>
+              <a:t>RESULTS. As the glider flies a flight path gaining altitude, it collects and runs the last 45 seconds of data through Gaussian process regression predicting the vertical velocity in a 20-meter radius around the glider. Because it predicts a probability distribution, which provides a measure of uncertainty, this can be used in determining whether it is beneficial to latch onto a thermal. The glider will start circling the point of the highest predicted vertical velocity if with 85 percent confidence this velocity is above a certain threshold. Figure 3 shows a test in simulation where the glider successfully found a thermal and has orbited it twice.</a:t>
             </a:r>
             <a:endParaRPr kumimoji="1" lang="en-US" sz="3200" dirty="0">
               <a:solidFill>
@@ -7920,7 +7903,7 @@
             <p:spPr bwMode="auto">
               <a:xfrm>
                 <a:off x="29641800" y="6400800"/>
-                <a:ext cx="13182600" cy="1354483"/>
+                <a:ext cx="13182600" cy="3618589"/>
               </a:xfrm>
               <a:prstGeom prst="rect">
                 <a:avLst/>
@@ -7943,7 +7926,7 @@
                   <a:defRPr/>
                 </a:pPr>
                 <a:r>
-                  <a:rPr kumimoji="1" lang="en-US" sz="3800" u="sng" dirty="0">
+                  <a:rPr kumimoji="1" lang="en-US" sz="3800" u="sng" dirty="0" smtClean="0">
                     <a:solidFill>
                       <a:schemeClr val="bg1"/>
                     </a:solidFill>
@@ -7951,8 +7934,16 @@
                     <a:ea typeface="+mj-ea"/>
                     <a:cs typeface="+mj-cs"/>
                   </a:rPr>
-                  <a:t>RESULTS</a:t>
+                  <a:t>IMPROVEMENT: POLICY DEVELOPMENT</a:t>
                 </a:r>
+                <a:endParaRPr kumimoji="1" lang="en-US" sz="3800" u="sng" dirty="0">
+                  <a:solidFill>
+                    <a:schemeClr val="bg1"/>
+                  </a:solidFill>
+                  <a:latin typeface="+mj-lt"/>
+                  <a:ea typeface="+mj-ea"/>
+                  <a:cs typeface="+mj-cs"/>
+                </a:endParaRPr>
               </a:p>
               <a:p>
                 <a:pPr algn="ctr" defTabSz="4389438">
@@ -7967,7 +7958,7 @@
                   <a:defRPr/>
                 </a:pPr>
                 <a:r>
-                  <a:rPr kumimoji="1" lang="en-US" sz="3200" dirty="0">
+                  <a:rPr kumimoji="1" lang="en-US" sz="3200" dirty="0" smtClean="0">
                     <a:solidFill>
                       <a:schemeClr val="bg1"/>
                     </a:solidFill>
@@ -7975,117 +7966,10 @@
                     <a:ea typeface="+mj-ea"/>
                     <a:cs typeface="+mj-cs"/>
                   </a:rPr>
-                  <a:t>The final choice for the design was a W12X40 for the moment frames, a 10X49 for the door beam, W10X33 for the connecting beams, and a ¾ inch tension rod. The maximum deflection in the roof was just over a half inch and just over a quarter of an inch in the walls. The door beam experienced a deflection of a half inch in the local-y direction and just over 2 inches in the local-x direction.</a:t>
+                  <a:t>OVERVIEW OF METHODS EXPLORED: </a:t>
                 </a:r>
-              </a:p>
-            </p:txBody>
-          </p:sp>
-        </p:grpSp>
-        <p:grpSp>
-          <p:nvGrpSpPr>
-            <p:cNvPr id="1119" name="Group 139"/>
-            <p:cNvGrpSpPr>
-              <a:grpSpLocks/>
-            </p:cNvGrpSpPr>
-            <p:nvPr/>
-          </p:nvGrpSpPr>
-          <p:grpSpPr bwMode="auto">
-            <a:xfrm>
-              <a:off x="30403800" y="10896600"/>
-              <a:ext cx="11658600" cy="8858310"/>
-              <a:chOff x="30403800" y="10515600"/>
-              <a:chExt cx="11658600" cy="8858310"/>
-            </a:xfrm>
-          </p:grpSpPr>
-          <p:pic>
-            <p:nvPicPr>
-              <p:cNvPr id="4" name="Picture 135" descr="RISA.JPG"/>
-              <p:cNvPicPr>
-                <a:picLocks noChangeAspect="1"/>
-              </p:cNvPicPr>
-              <p:nvPr/>
-            </p:nvPicPr>
-            <p:blipFill>
-              <a:blip r:embed="rId8">
-                <a:extLst>
-                  <a:ext uri="{28A0092B-C50C-407E-A947-70E740481C1C}">
-                    <a14:useLocalDpi xmlns:a14="http://schemas.microsoft.com/office/drawing/2010/main" val="0"/>
-                  </a:ext>
-                </a:extLst>
-              </a:blip>
-              <a:srcRect l="50000"/>
-              <a:stretch>
-                <a:fillRect/>
-              </a:stretch>
-            </p:blipFill>
-            <p:spPr bwMode="auto">
-              <a:xfrm>
-                <a:off x="30784800" y="10515600"/>
-                <a:ext cx="11049000" cy="8286750"/>
-              </a:xfrm>
-              <a:prstGeom prst="rect">
-                <a:avLst/>
-              </a:prstGeom>
-              <a:noFill/>
-              <a:ln>
-                <a:noFill/>
-              </a:ln>
-              <a:extLst>
-                <a:ext uri="{909E8E84-426E-40DD-AFC4-6F175D3DCCD1}">
-                  <a14:hiddenFill xmlns:a14="http://schemas.microsoft.com/office/drawing/2010/main">
-                    <a:solidFill>
-                      <a:srgbClr val="FFFFFF"/>
-                    </a:solidFill>
-                  </a14:hiddenFill>
-                </a:ext>
-                <a:ext uri="{91240B29-F687-4F45-9708-019B960494DF}">
-                  <a14:hiddenLine xmlns:a14="http://schemas.microsoft.com/office/drawing/2010/main" w="9525">
-                    <a:solidFill>
-                      <a:srgbClr val="000000"/>
-                    </a:solidFill>
-                    <a:miter lim="800000"/>
-                    <a:headEnd/>
-                    <a:tailEnd/>
-                  </a14:hiddenLine>
-                </a:ext>
-              </a:extLst>
-            </p:spPr>
-          </p:pic>
-          <p:sp>
-            <p:nvSpPr>
-              <p:cNvPr id="1115" name="TextBox 136"/>
-              <p:cNvSpPr txBox="1">
-                <a:spLocks noChangeArrowheads="1"/>
-              </p:cNvSpPr>
-              <p:nvPr/>
-            </p:nvSpPr>
-            <p:spPr bwMode="auto">
-              <a:xfrm>
-                <a:off x="30403800" y="18973800"/>
-                <a:ext cx="11658600" cy="400050"/>
-              </a:xfrm>
-              <a:prstGeom prst="rect">
-                <a:avLst/>
-              </a:prstGeom>
-              <a:noFill/>
-              <a:ln w="9525">
-                <a:noFill/>
-                <a:miter lim="800000"/>
-                <a:headEnd/>
-                <a:tailEnd/>
-              </a:ln>
-            </p:spPr>
-            <p:txBody>
-              <a:bodyPr>
-                <a:spAutoFit/>
-              </a:bodyPr>
-              <a:lstStyle/>
-              <a:p>
-                <a:pPr algn="ctr">
-                  <a:defRPr/>
-                </a:pPr>
                 <a:r>
-                  <a:rPr kumimoji="1" lang="en-US" sz="2000" dirty="0">
+                  <a:rPr kumimoji="1" lang="en-CA" sz="3200" dirty="0">
                     <a:solidFill>
                       <a:schemeClr val="bg1"/>
                     </a:solidFill>
@@ -8093,12 +7977,67 @@
                     <a:ea typeface="+mj-ea"/>
                     <a:cs typeface="+mj-cs"/>
                   </a:rPr>
-                  <a:t>Figure 3: Example of RISA’s Output</a:t>
+                  <a:t>Under the centroid method, the UAV circles the estimated thermal center at a fixed radius. One improvement on this method is to develop strategies for extracting energy from the thermal that are more flexible. We investigated three approaches to achieve this with machine learning: tabled-based Q learning, neural fitted Q learning, and dynamic programming with neural interpolation. Tabled-based Q learning discretizes the state space, and develops estimates for the value of performing each possible action in each discretized chunk using Q learning. We used this method successfully in a highly idealized setting, but we had some difficulty in using it to scale it up. Future work could include focusing on variable chunking size, allowing for better scaling. Neural-fitted Q learning also uses Q learning, but stores value estimates using a neural network. We had only limited success with this method, and future work would focus on incorporating new information into a neural network without losing the old information stored. Dynamic programming with neural interpolation is a model based method, using a model of the system to carry out dynamic programming. To allow for a continuously varying policy, the value estimates and policy estimates are both stored in neural networks. </a:t>
                 </a:r>
+                <a:endParaRPr kumimoji="1" lang="en-US" sz="3200" dirty="0">
+                  <a:solidFill>
+                    <a:schemeClr val="bg1"/>
+                  </a:solidFill>
+                  <a:latin typeface="+mj-lt"/>
+                  <a:ea typeface="+mj-ea"/>
+                  <a:cs typeface="+mj-cs"/>
+                </a:endParaRPr>
               </a:p>
             </p:txBody>
           </p:sp>
         </p:grpSp>
+        <p:sp>
+          <p:nvSpPr>
+            <p:cNvPr id="1115" name="TextBox 136"/>
+            <p:cNvSpPr txBox="1">
+              <a:spLocks noChangeArrowheads="1"/>
+            </p:cNvSpPr>
+            <p:nvPr/>
+          </p:nvSpPr>
+          <p:spPr bwMode="auto">
+            <a:xfrm>
+              <a:off x="30403800" y="19354800"/>
+              <a:ext cx="11658600" cy="400050"/>
+            </a:xfrm>
+            <a:prstGeom prst="rect">
+              <a:avLst/>
+            </a:prstGeom>
+            <a:noFill/>
+            <a:ln w="9525">
+              <a:noFill/>
+              <a:miter lim="800000"/>
+              <a:headEnd/>
+              <a:tailEnd/>
+            </a:ln>
+          </p:spPr>
+          <p:txBody>
+            <a:bodyPr>
+              <a:spAutoFit/>
+            </a:bodyPr>
+            <a:lstStyle/>
+            <a:p>
+              <a:pPr algn="ctr">
+                <a:defRPr/>
+              </a:pPr>
+              <a:r>
+                <a:rPr kumimoji="1" lang="en-US" sz="2000" dirty="0">
+                  <a:solidFill>
+                    <a:schemeClr val="bg1"/>
+                  </a:solidFill>
+                  <a:latin typeface="+mj-lt"/>
+                  <a:ea typeface="+mj-ea"/>
+                  <a:cs typeface="+mj-cs"/>
+                </a:rPr>
+                <a:t>Figure 3: Example of RISA’s Output</a:t>
+              </a:r>
+            </a:p>
+          </p:txBody>
+        </p:sp>
         <p:sp>
           <p:nvSpPr>
             <p:cNvPr id="5" name="TextBox 137"/>
@@ -8109,8 +8048,8 @@
           </p:nvSpPr>
           <p:spPr bwMode="auto">
             <a:xfrm>
-              <a:off x="29641800" y="19888200"/>
-              <a:ext cx="13030200" cy="3046413"/>
+              <a:off x="29679900" y="23703274"/>
+              <a:ext cx="13030200" cy="3046988"/>
             </a:xfrm>
             <a:prstGeom prst="rect">
               <a:avLst/>
@@ -8133,7 +8072,7 @@
                 <a:defRPr/>
               </a:pPr>
               <a:r>
-                <a:rPr kumimoji="1" lang="en-US" sz="3200" dirty="0">
+                <a:rPr kumimoji="1" lang="en-CA" sz="3200" dirty="0">
                   <a:solidFill>
                     <a:schemeClr val="bg1"/>
                   </a:solidFill>
@@ -8141,81 +8080,55 @@
                   <a:ea typeface="+mj-ea"/>
                   <a:cs typeface="+mj-cs"/>
                 </a:rPr>
-                <a:t>The cost for the engineered structure represented February 2008 steel prices, secondary frame, cladding, and estimated engineering costs. The cost was slightly lower than that obtained from a custom steel  builder but much greater than the pre-engineered building suppliers and also higher than a comparable wood structure as shown in Figure 4.</a:t>
+                <a:t>RESULTS: </a:t>
+              </a:r>
+              <a:r>
+                <a:rPr kumimoji="1" lang="en-CA" sz="3200" dirty="0" smtClean="0">
+                  <a:solidFill>
+                    <a:schemeClr val="bg1"/>
+                  </a:solidFill>
+                  <a:latin typeface="+mj-lt"/>
+                  <a:ea typeface="+mj-ea"/>
+                  <a:cs typeface="+mj-cs"/>
+                </a:rPr>
+                <a:t>We </a:t>
+              </a:r>
+              <a:r>
+                <a:rPr kumimoji="1" lang="en-CA" sz="3200" dirty="0">
+                  <a:solidFill>
+                    <a:schemeClr val="bg1"/>
+                  </a:solidFill>
+                  <a:latin typeface="+mj-lt"/>
+                  <a:ea typeface="+mj-ea"/>
+                  <a:cs typeface="+mj-cs"/>
+                </a:rPr>
+                <a:t>had the most success using dynamic programming with neural interpolation. A plausible and flexible policy was developed that adjusts to thermal position and shape. State variables used were: position from center of thermal, height of UAV, and direction of UAV. Current work is focused on testing the algorithms developed in the more sophisticated </a:t>
+              </a:r>
+              <a:r>
+                <a:rPr kumimoji="1" lang="en-CA" sz="3200" dirty="0" err="1">
+                  <a:solidFill>
+                    <a:schemeClr val="bg1"/>
+                  </a:solidFill>
+                  <a:latin typeface="+mj-lt"/>
+                  <a:ea typeface="+mj-ea"/>
+                  <a:cs typeface="+mj-cs"/>
+                </a:rPr>
+                <a:t>ccrcsim</a:t>
+              </a:r>
+              <a:r>
+                <a:rPr kumimoji="1" lang="en-CA" sz="3200" dirty="0">
+                  <a:solidFill>
+                    <a:schemeClr val="bg1"/>
+                  </a:solidFill>
+                  <a:latin typeface="+mj-lt"/>
+                  <a:ea typeface="+mj-ea"/>
+                  <a:cs typeface="+mj-cs"/>
+                </a:rPr>
+                <a:t> simulator.</a:t>
               </a:r>
             </a:p>
           </p:txBody>
         </p:sp>
-        <p:graphicFrame>
-          <p:nvGraphicFramePr>
-            <p:cNvPr id="1026" name="Object 197"/>
-            <p:cNvGraphicFramePr>
-              <a:graphicFrameLocks noChangeAspect="1"/>
-            </p:cNvGraphicFramePr>
-            <p:nvPr/>
-          </p:nvGraphicFramePr>
-          <p:xfrm>
-            <a:off x="29946600" y="23012400"/>
-            <a:ext cx="12573000" cy="3314700"/>
-          </p:xfrm>
-          <a:graphic>
-            <a:graphicData uri="http://schemas.openxmlformats.org/presentationml/2006/ole">
-              <mc:AlternateContent xmlns:mc="http://schemas.openxmlformats.org/markup-compatibility/2006">
-                <mc:Choice xmlns:v="urn:schemas-microsoft-com:vml" Requires="v">
-                  <p:oleObj spid="_x0000_s1261" name="Worksheet" r:id="rId9" imgW="4991269" imgH="1304883" progId="Excel.Sheet.12">
-                    <p:embed/>
-                  </p:oleObj>
-                </mc:Choice>
-                <mc:Fallback>
-                  <p:oleObj name="Worksheet" r:id="rId9" imgW="4991269" imgH="1304883" progId="Excel.Sheet.12">
-                    <p:embed/>
-                    <p:pic>
-                      <p:nvPicPr>
-                        <p:cNvPr id="0" name="Object 197"/>
-                        <p:cNvPicPr>
-                          <a:picLocks noChangeAspect="1" noChangeArrowheads="1"/>
-                        </p:cNvPicPr>
-                        <p:nvPr/>
-                      </p:nvPicPr>
-                      <p:blipFill>
-                        <a:blip r:embed="rId10">
-                          <a:extLst>
-                            <a:ext uri="{28A0092B-C50C-407E-A947-70E740481C1C}">
-                              <a14:useLocalDpi xmlns:a14="http://schemas.microsoft.com/office/drawing/2010/main" val="0"/>
-                            </a:ext>
-                          </a:extLst>
-                        </a:blip>
-                        <a:srcRect/>
-                        <a:stretch>
-                          <a:fillRect/>
-                        </a:stretch>
-                      </p:blipFill>
-                      <p:spPr bwMode="auto">
-                        <a:xfrm>
-                          <a:off x="29946600" y="23012400"/>
-                          <a:ext cx="12573000" cy="3314700"/>
-                        </a:xfrm>
-                        <a:prstGeom prst="rect">
-                          <a:avLst/>
-                        </a:prstGeom>
-                        <a:noFill/>
-                        <a:extLst>
-                          <a:ext uri="{909E8E84-426E-40DD-AFC4-6F175D3DCCD1}">
-                            <a14:hiddenFill xmlns:a14="http://schemas.microsoft.com/office/drawing/2010/main">
-                              <a:solidFill>
-                                <a:srgbClr val="FFFFFF"/>
-                              </a:solidFill>
-                            </a14:hiddenFill>
-                          </a:ext>
-                        </a:extLst>
-                      </p:spPr>
-                    </p:pic>
-                  </p:oleObj>
-                </mc:Fallback>
-              </mc:AlternateContent>
-            </a:graphicData>
-          </a:graphic>
-        </p:graphicFrame>
       </p:grpSp>
       <p:sp>
         <p:nvSpPr>
@@ -8225,8 +8138,8 @@
         </p:nvSpPr>
         <p:spPr>
           <a:xfrm>
-            <a:off x="31699200" y="26441400"/>
-            <a:ext cx="8534400" cy="400050"/>
+            <a:off x="31775400" y="22725543"/>
+            <a:ext cx="8839200" cy="1015663"/>
           </a:xfrm>
           <a:prstGeom prst="rect">
             <a:avLst/>
@@ -8234,7 +8147,7 @@
           <a:noFill/>
         </p:spPr>
         <p:txBody>
-          <a:bodyPr>
+          <a:bodyPr wrap="square">
             <a:spAutoFit/>
           </a:bodyPr>
           <a:lstStyle/>
@@ -8243,7 +8156,7 @@
               <a:defRPr/>
             </a:pPr>
             <a:r>
-              <a:rPr kumimoji="1" lang="en-US" sz="2000" dirty="0">
+              <a:rPr kumimoji="1" lang="en-US" sz="2000" dirty="0" smtClean="0">
                 <a:solidFill>
                   <a:schemeClr val="bg1"/>
                 </a:solidFill>
@@ -8251,8 +8164,16 @@
                 <a:ea typeface="+mj-ea"/>
                 <a:cs typeface="+mj-cs"/>
               </a:rPr>
-              <a:t>Figure 4: Cost Comparison</a:t>
+              <a:t>Figure 4: Value and policy estimates with thermal at 5. In the policy plot, blue = travel towards origin, green = travel away from origin, and red = orbit.</a:t>
             </a:r>
+            <a:endParaRPr kumimoji="1" lang="en-US" sz="2000" dirty="0">
+              <a:solidFill>
+                <a:schemeClr val="bg1"/>
+              </a:solidFill>
+              <a:latin typeface="+mj-lt"/>
+              <a:ea typeface="+mj-ea"/>
+              <a:cs typeface="+mj-cs"/>
+            </a:endParaRPr>
           </a:p>
         </p:txBody>
       </p:sp>
@@ -8265,7 +8186,7 @@
           <p:nvPr/>
         </p:nvPicPr>
         <p:blipFill>
-          <a:blip r:embed="rId11">
+          <a:blip r:embed="rId8">
             <a:extLst>
               <a:ext uri="{28A0092B-C50C-407E-A947-70E740481C1C}">
                 <a14:useLocalDpi xmlns:a14="http://schemas.microsoft.com/office/drawing/2010/main" val="0"/>
@@ -8319,7 +8240,7 @@
           <p:nvPr/>
         </p:nvPicPr>
         <p:blipFill rotWithShape="1">
-          <a:blip r:embed="rId12">
+          <a:blip r:embed="rId9">
             <a:extLst>
               <a:ext uri="{28A0092B-C50C-407E-A947-70E740481C1C}">
                 <a14:useLocalDpi xmlns:a14="http://schemas.microsoft.com/office/drawing/2010/main" val="0"/>
@@ -8348,7 +8269,7 @@
           <p:nvPr/>
         </p:nvPicPr>
         <p:blipFill>
-          <a:blip r:embed="rId13">
+          <a:blip r:embed="rId10">
             <a:extLst>
               <a:ext uri="{28A0092B-C50C-407E-A947-70E740481C1C}">
                 <a14:useLocalDpi xmlns:a14="http://schemas.microsoft.com/office/drawing/2010/main" val="0"/>
@@ -8425,18 +8346,7 @@
                 <a:ea typeface="+mj-ea"/>
                 <a:cs typeface="+mj-cs"/>
               </a:rPr>
-              <a:t>Gaussian process regression (center) compared with Bayesian parameter estimation (right) learning what a simple Gaussian-shaped thermal model looks like </a:t>
-            </a:r>
-            <a:r>
-              <a:rPr kumimoji="1" lang="en-US" sz="2000" dirty="0" smtClean="0">
-                <a:solidFill>
-                  <a:schemeClr val="bg1"/>
-                </a:solidFill>
-                <a:latin typeface="+mj-lt"/>
-                <a:ea typeface="+mj-ea"/>
-                <a:cs typeface="+mj-cs"/>
-              </a:rPr>
-              <a:t>given only discrete points along a circular flight path (left)</a:t>
+              <a:t>Gaussian process regression (center) compared with Bayesian parameter estimation (right) learning what a simple Gaussian-shaped thermal model looks like given only discrete points along a circular flight path (left)</a:t>
             </a:r>
             <a:endParaRPr kumimoji="1" lang="en-US" sz="2000" dirty="0">
               <a:solidFill>
@@ -8449,9 +8359,33 @@
           </a:p>
         </p:txBody>
       </p:sp>
+      <p:pic>
+        <p:nvPicPr>
+          <p:cNvPr id="7" name="Picture 6"/>
+          <p:cNvPicPr>
+            <a:picLocks noChangeAspect="1"/>
+          </p:cNvPicPr>
+          <p:nvPr/>
+        </p:nvPicPr>
+        <p:blipFill>
+          <a:blip r:embed="rId11"/>
+          <a:stretch>
+            <a:fillRect/>
+          </a:stretch>
+        </p:blipFill>
+        <p:spPr>
+          <a:xfrm>
+            <a:off x="30990600" y="14315108"/>
+            <a:ext cx="10824150" cy="8087784"/>
+          </a:xfrm>
+          <a:prstGeom prst="rect">
+            <a:avLst/>
+          </a:prstGeom>
+        </p:spPr>
+      </p:pic>
     </p:spTree>
     <p:custDataLst>
-      <p:tags r:id="rId2"/>
+      <p:tags r:id="rId1"/>
     </p:custDataLst>
   </p:cSld>
   <p:clrMapOvr>

</xml_diff>

<commit_message>
Reworded GPR portion, added some references
</commit_message>
<xml_diff>
--- a/Poster.pptx
+++ b/Poster.pptx
@@ -247,7 +247,7 @@
               <a:pPr>
                 <a:defRPr/>
               </a:pPr>
-              <a:t>5/29/2016</a:t>
+              <a:t>5/30/2016</a:t>
             </a:fld>
             <a:endParaRPr lang="en-US"/>
           </a:p>
@@ -4621,7 +4621,7 @@
         <p:spPr bwMode="auto">
           <a:xfrm>
             <a:off x="15125700" y="6324600"/>
-            <a:ext cx="13487400" cy="20878800"/>
+            <a:ext cx="13487400" cy="21188680"/>
           </a:xfrm>
           <a:prstGeom prst="rect">
             <a:avLst/>
@@ -4890,7 +4890,7 @@
           <p:spPr bwMode="auto">
             <a:xfrm>
               <a:off x="29718000" y="23240471"/>
-              <a:ext cx="12649200" cy="2812465"/>
+              <a:ext cx="13087350" cy="2811551"/>
             </a:xfrm>
             <a:prstGeom prst="rect">
               <a:avLst/>
@@ -4904,7 +4904,7 @@
             </a:ln>
           </p:spPr>
           <p:txBody>
-            <a:bodyPr lIns="91426" tIns="45710" rIns="91426" bIns="45710">
+            <a:bodyPr wrap="square" lIns="91426" tIns="45710" rIns="91426" bIns="45710">
               <a:spAutoFit/>
             </a:bodyPr>
             <a:lstStyle/>
@@ -4949,18 +4949,7 @@
                   <a:ea typeface="+mj-ea"/>
                   <a:cs typeface="+mj-cs"/>
                 </a:rPr>
-                <a:t>AISC Steel Construction Manual</a:t>
-              </a:r>
-              <a:r>
-                <a:rPr kumimoji="1" lang="en-US" sz="2000" dirty="0">
-                  <a:solidFill>
-                    <a:schemeClr val="bg1"/>
-                  </a:solidFill>
-                  <a:latin typeface="+mj-lt"/>
-                  <a:ea typeface="+mj-ea"/>
-                  <a:cs typeface="+mj-cs"/>
-                </a:rPr>
-                <a:t>. 13th ed. 2006-.</a:t>
+                <a:t>Allen, Michael J. "Autonomous soaring for improved endurance of a small uninhabited air vehicle." Proceedings of the 43rd aerospace sciences meeting, AIAA. 2005.</a:t>
               </a:r>
             </a:p>
             <a:p>
@@ -4979,18 +4968,7 @@
                   <a:ea typeface="+mj-ea"/>
                   <a:cs typeface="+mj-cs"/>
                 </a:rPr>
-                <a:t>ASCE 7-05 Minimum Design Loads for Buildings and other Structures</a:t>
-              </a:r>
-              <a:r>
-                <a:rPr kumimoji="1" lang="en-US" sz="2000" dirty="0">
-                  <a:solidFill>
-                    <a:schemeClr val="bg1"/>
-                  </a:solidFill>
-                  <a:latin typeface="+mj-lt"/>
-                  <a:ea typeface="+mj-ea"/>
-                  <a:cs typeface="+mj-cs"/>
-                </a:rPr>
-                <a:t>. 2006-.</a:t>
+                <a:t>Edwards, Daniel J. Autonomous Locator of Thermals (ALOFT) Autonomous Soaring Algorithm. No. NRL/FR/5712--15-10. NAVAL RESEARCH LAB WASHINGTON DC, 2015.</a:t>
               </a:r>
             </a:p>
             <a:p>
@@ -5001,6 +4979,17 @@
                 <a:defRPr/>
               </a:pPr>
               <a:r>
+                <a:rPr kumimoji="1" lang="en-US" sz="2000" i="1" dirty="0" err="1">
+                  <a:solidFill>
+                    <a:schemeClr val="bg1"/>
+                  </a:solidFill>
+                  <a:latin typeface="+mj-lt"/>
+                  <a:ea typeface="+mj-ea"/>
+                  <a:cs typeface="+mj-cs"/>
+                </a:rPr>
+                <a:t>Korb</a:t>
+              </a:r>
+              <a:r>
                 <a:rPr kumimoji="1" lang="en-US" sz="2000" i="1" dirty="0">
                   <a:solidFill>
                     <a:schemeClr val="bg1"/>
@@ -5009,18 +4998,7 @@
                   <a:ea typeface="+mj-ea"/>
                   <a:cs typeface="+mj-cs"/>
                 </a:rPr>
-                <a:t>International Building Code</a:t>
-              </a:r>
-              <a:r>
-                <a:rPr kumimoji="1" lang="en-US" sz="2000" dirty="0">
-                  <a:solidFill>
-                    <a:schemeClr val="bg1"/>
-                  </a:solidFill>
-                  <a:latin typeface="+mj-lt"/>
-                  <a:ea typeface="+mj-ea"/>
-                  <a:cs typeface="+mj-cs"/>
-                </a:rPr>
-                <a:t>. 2006-.</a:t>
+                <a:t>, Kevin B., and Ann E. Nicholson. Bayesian Artificial Intelligence. Boca Raton, FL: CRC, 2010. Print.</a:t>
               </a:r>
             </a:p>
             <a:p>
@@ -5031,7 +5009,7 @@
                 <a:defRPr/>
               </a:pPr>
               <a:r>
-                <a:rPr kumimoji="1" lang="en-US" sz="2000" dirty="0" err="1">
+                <a:rPr kumimoji="1" lang="en-US" sz="2000" i="1" dirty="0" err="1">
                   <a:solidFill>
                     <a:schemeClr val="bg1"/>
                   </a:solidFill>
@@ -5039,18 +5017,7 @@
                   <a:ea typeface="+mj-ea"/>
                   <a:cs typeface="+mj-cs"/>
                 </a:rPr>
-                <a:t>McCormac</a:t>
-              </a:r>
-              <a:r>
-                <a:rPr kumimoji="1" lang="en-US" sz="2000" dirty="0">
-                  <a:solidFill>
-                    <a:schemeClr val="bg1"/>
-                  </a:solidFill>
-                  <a:latin typeface="+mj-lt"/>
-                  <a:ea typeface="+mj-ea"/>
-                  <a:cs typeface="+mj-cs"/>
-                </a:rPr>
-                <a:t>, Jack C. </a:t>
+                <a:t>Lawrance</a:t>
               </a:r>
               <a:r>
                 <a:rPr kumimoji="1" lang="en-US" sz="2000" i="1" dirty="0">
@@ -5061,67 +5028,7 @@
                   <a:ea typeface="+mj-ea"/>
                   <a:cs typeface="+mj-cs"/>
                 </a:rPr>
-                <a:t>Structural Steel Design</a:t>
-              </a:r>
-              <a:r>
-                <a:rPr kumimoji="1" lang="en-US" sz="2000" dirty="0">
-                  <a:solidFill>
-                    <a:schemeClr val="bg1"/>
-                  </a:solidFill>
-                  <a:latin typeface="+mj-lt"/>
-                  <a:ea typeface="+mj-ea"/>
-                  <a:cs typeface="+mj-cs"/>
-                </a:rPr>
-                <a:t>. 4th ed. 2008.</a:t>
-              </a:r>
-            </a:p>
-            <a:p>
-              <a:pPr>
-                <a:lnSpc>
-                  <a:spcPct val="150000"/>
-                </a:lnSpc>
-                <a:defRPr/>
-              </a:pPr>
-              <a:r>
-                <a:rPr kumimoji="1" lang="en-US" sz="2000" dirty="0">
-                  <a:solidFill>
-                    <a:schemeClr val="bg1"/>
-                  </a:solidFill>
-                  <a:latin typeface="+mj-lt"/>
-                  <a:ea typeface="+mj-ea"/>
-                  <a:cs typeface="+mj-cs"/>
-                </a:rPr>
-                <a:t>Summers, Mark. Technical Advisor. U.S. Army Corps of Engineers.</a:t>
-              </a:r>
-            </a:p>
-            <a:p>
-              <a:pPr>
-                <a:lnSpc>
-                  <a:spcPct val="150000"/>
-                </a:lnSpc>
-                <a:defRPr/>
-              </a:pPr>
-              <a:r>
-                <a:rPr kumimoji="1" lang="en-US" sz="2000" i="1" dirty="0">
-                  <a:solidFill>
-                    <a:schemeClr val="bg1"/>
-                  </a:solidFill>
-                  <a:latin typeface="+mj-lt"/>
-                  <a:ea typeface="+mj-ea"/>
-                  <a:cs typeface="+mj-cs"/>
-                </a:rPr>
-                <a:t>Walla Walla Ordinance No. 346</a:t>
-              </a:r>
-              <a:r>
-                <a:rPr kumimoji="1" lang="en-US" sz="2000" dirty="0">
-                  <a:solidFill>
-                    <a:schemeClr val="bg1"/>
-                  </a:solidFill>
-                  <a:latin typeface="+mj-lt"/>
-                  <a:ea typeface="+mj-ea"/>
-                  <a:cs typeface="+mj-cs"/>
-                </a:rPr>
-                <a:t>. 2007-.</a:t>
+                <a:t>, Nicholas RJ. Autonomous soaring flight for unmanned aerial vehicles. Diss. University of Sydney, 2011.</a:t>
               </a:r>
             </a:p>
           </p:txBody>
@@ -6585,8 +6492,8 @@
           </p:txBody>
         </p:sp>
       </p:grpSp>
-      <mc:AlternateContent xmlns:mc="http://schemas.openxmlformats.org/markup-compatibility/2006" xmlns:a14="http://schemas.microsoft.com/office/drawing/2010/main">
-        <mc:Choice Requires="a14">
+      <mc:AlternateContent xmlns:mc="http://schemas.openxmlformats.org/markup-compatibility/2006">
+        <mc:Choice xmlns:a14="http://schemas.microsoft.com/office/drawing/2010/main" Requires="a14">
           <p:sp>
             <p:nvSpPr>
               <p:cNvPr id="1041" name="Text Box 74"/>
@@ -6709,13 +6616,79 @@
                     <a:ea typeface="+mj-ea"/>
                     <a:cs typeface="+mj-cs"/>
                   </a:rPr>
-                  <a:t>. Because of its speed and superior prediction in tests, Gaussian process regression was pursued further, being implemented in simulation.</a:t>
+                  <a:t>. Because of </a:t>
+                </a:r>
+                <a:r>
+                  <a:rPr kumimoji="1" lang="en-US" sz="3200" dirty="0" smtClean="0">
+                    <a:solidFill>
+                      <a:schemeClr val="bg1"/>
+                    </a:solidFill>
+                    <a:latin typeface="+mj-lt"/>
+                    <a:ea typeface="+mj-ea"/>
+                    <a:cs typeface="+mj-cs"/>
+                  </a:rPr>
+                  <a:t>its superior predictions and execution </a:t>
+                </a:r>
+                <a:r>
+                  <a:rPr kumimoji="1" lang="en-US" sz="3200" dirty="0" smtClean="0">
+                    <a:solidFill>
+                      <a:schemeClr val="bg1"/>
+                    </a:solidFill>
+                    <a:latin typeface="+mj-lt"/>
+                    <a:ea typeface="+mj-ea"/>
+                    <a:cs typeface="+mj-cs"/>
+                  </a:rPr>
+                  <a:t>speed </a:t>
+                </a:r>
+                <a:r>
+                  <a:rPr kumimoji="1" lang="en-US" sz="3200" dirty="0" smtClean="0">
+                    <a:solidFill>
+                      <a:schemeClr val="bg1"/>
+                    </a:solidFill>
+                    <a:latin typeface="+mj-lt"/>
+                    <a:ea typeface="+mj-ea"/>
+                    <a:cs typeface="+mj-cs"/>
+                  </a:rPr>
+                  <a:t>in </a:t>
+                </a:r>
+                <a:r>
+                  <a:rPr kumimoji="1" lang="en-US" sz="3200" dirty="0" smtClean="0">
+                    <a:solidFill>
+                      <a:schemeClr val="bg1"/>
+                    </a:solidFill>
+                    <a:latin typeface="+mj-lt"/>
+                    <a:ea typeface="+mj-ea"/>
+                    <a:cs typeface="+mj-cs"/>
+                  </a:rPr>
+                  <a:t>tests, Gaussian process regression was pursued </a:t>
+                </a:r>
+                <a:r>
+                  <a:rPr kumimoji="1" lang="en-US" sz="3200" dirty="0" smtClean="0">
+                    <a:solidFill>
+                      <a:schemeClr val="bg1"/>
+                    </a:solidFill>
+                    <a:latin typeface="+mj-lt"/>
+                    <a:ea typeface="+mj-ea"/>
+                    <a:cs typeface="+mj-cs"/>
+                  </a:rPr>
+                  <a:t>further and implemented </a:t>
+                </a:r>
+                <a:r>
+                  <a:rPr kumimoji="1" lang="en-US" sz="3200" dirty="0" smtClean="0">
+                    <a:solidFill>
+                      <a:schemeClr val="bg1"/>
+                    </a:solidFill>
+                    <a:latin typeface="+mj-lt"/>
+                    <a:ea typeface="+mj-ea"/>
+                    <a:cs typeface="+mj-cs"/>
+                  </a:rPr>
+                  <a:t>in simulation.</a:t>
                 </a:r>
               </a:p>
             </p:txBody>
           </p:sp>
         </mc:Choice>
-        <mc:Fallback xmlns="">
+        <mc:Fallback>
           <p:sp>
             <p:nvSpPr>
               <p:cNvPr id="1041" name="Text Box 74"/>
@@ -6733,7 +6706,7 @@
                 <a:avLst/>
               </a:prstGeom>
               <a:blipFill>
-                <a:blip r:embed="rId5"/>
+                <a:blip r:embed="rId4"/>
                 <a:stretch>
                   <a:fillRect l="-1182" t="-1702" r="-1136" b="-2302"/>
                 </a:stretch>
@@ -6922,7 +6895,7 @@
         </p:nvSpPr>
         <p:spPr bwMode="auto">
           <a:xfrm>
-            <a:off x="15183465" y="21805941"/>
+            <a:off x="15125700" y="22160711"/>
             <a:ext cx="13335000" cy="400110"/>
           </a:xfrm>
           <a:prstGeom prst="rect">
@@ -7177,7 +7150,7 @@
         </p:nvSpPr>
         <p:spPr bwMode="auto">
           <a:xfrm>
-            <a:off x="15240000" y="22225947"/>
+            <a:off x="15240000" y="22774893"/>
             <a:ext cx="13182600" cy="4524315"/>
           </a:xfrm>
           <a:prstGeom prst="rect">
@@ -7192,7 +7165,7 @@
           </a:ln>
         </p:spPr>
         <p:txBody>
-          <a:bodyPr>
+          <a:bodyPr wrap="square">
             <a:spAutoFit/>
           </a:bodyPr>
           <a:lstStyle/>
@@ -7442,7 +7415,7 @@
               <p:nvPr/>
             </p:nvPicPr>
             <p:blipFill>
-              <a:blip r:embed="rId6">
+              <a:blip r:embed="rId5">
                 <a:extLst>
                   <a:ext uri="{28A0092B-C50C-407E-A947-70E740481C1C}">
                     <a14:useLocalDpi xmlns:a14="http://schemas.microsoft.com/office/drawing/2010/main" val="0"/>
@@ -7670,7 +7643,7 @@
               <p:nvPr/>
             </p:nvPicPr>
             <p:blipFill>
-              <a:blip r:embed="rId7">
+              <a:blip r:embed="rId6">
                 <a:extLst>
                   <a:ext uri="{28A0092B-C50C-407E-A947-70E740481C1C}">
                     <a14:useLocalDpi xmlns:a14="http://schemas.microsoft.com/office/drawing/2010/main" val="0"/>
@@ -8186,7 +8159,7 @@
           <p:nvPr/>
         </p:nvPicPr>
         <p:blipFill>
-          <a:blip r:embed="rId8">
+          <a:blip r:embed="rId7">
             <a:extLst>
               <a:ext uri="{28A0092B-C50C-407E-A947-70E740481C1C}">
                 <a14:useLocalDpi xmlns:a14="http://schemas.microsoft.com/office/drawing/2010/main" val="0"/>
@@ -8240,7 +8213,7 @@
           <p:nvPr/>
         </p:nvPicPr>
         <p:blipFill rotWithShape="1">
-          <a:blip r:embed="rId9">
+          <a:blip r:embed="rId8">
             <a:extLst>
               <a:ext uri="{28A0092B-C50C-407E-A947-70E740481C1C}">
                 <a14:useLocalDpi xmlns:a14="http://schemas.microsoft.com/office/drawing/2010/main" val="0"/>
@@ -8269,7 +8242,7 @@
           <p:nvPr/>
         </p:nvPicPr>
         <p:blipFill>
-          <a:blip r:embed="rId10">
+          <a:blip r:embed="rId9">
             <a:extLst>
               <a:ext uri="{28A0092B-C50C-407E-A947-70E740481C1C}">
                 <a14:useLocalDpi xmlns:a14="http://schemas.microsoft.com/office/drawing/2010/main" val="0"/>
@@ -8282,8 +8255,8 @@
         </p:blipFill>
         <p:spPr>
           <a:xfrm>
-            <a:off x="17069415" y="17854583"/>
-            <a:ext cx="9563100" cy="3800475"/>
+            <a:off x="15849600" y="17644681"/>
+            <a:ext cx="11636519" cy="4624473"/>
           </a:xfrm>
           <a:prstGeom prst="rect">
             <a:avLst/>
@@ -8300,7 +8273,7 @@
         </p:nvSpPr>
         <p:spPr bwMode="auto">
           <a:xfrm>
-            <a:off x="15187549" y="17100660"/>
+            <a:off x="15201900" y="16844465"/>
             <a:ext cx="13335000" cy="707886"/>
           </a:xfrm>
           <a:prstGeom prst="rect">
@@ -8368,7 +8341,7 @@
           <p:nvPr/>
         </p:nvPicPr>
         <p:blipFill>
-          <a:blip r:embed="rId11"/>
+          <a:blip r:embed="rId10"/>
           <a:stretch>
             <a:fillRect/>
           </a:stretch>

</xml_diff>

<commit_message>
Edited David's part of poster.
</commit_message>
<xml_diff>
--- a/Poster.pptx
+++ b/Poster.pptx
@@ -6492,8 +6492,8 @@
           </p:txBody>
         </p:sp>
       </p:grpSp>
-      <mc:AlternateContent xmlns:mc="http://schemas.openxmlformats.org/markup-compatibility/2006">
-        <mc:Choice xmlns:a14="http://schemas.microsoft.com/office/drawing/2010/main" Requires="a14">
+      <mc:AlternateContent xmlns:mc="http://schemas.openxmlformats.org/markup-compatibility/2006" xmlns:a14="http://schemas.microsoft.com/office/drawing/2010/main">
+        <mc:Choice Requires="a14">
           <p:sp>
             <p:nvSpPr>
               <p:cNvPr id="1041" name="Text Box 74"/>
@@ -6616,79 +6616,13 @@
                     <a:ea typeface="+mj-ea"/>
                     <a:cs typeface="+mj-cs"/>
                   </a:rPr>
-                  <a:t>. Because of </a:t>
-                </a:r>
-                <a:r>
-                  <a:rPr kumimoji="1" lang="en-US" sz="3200" dirty="0" smtClean="0">
-                    <a:solidFill>
-                      <a:schemeClr val="bg1"/>
-                    </a:solidFill>
-                    <a:latin typeface="+mj-lt"/>
-                    <a:ea typeface="+mj-ea"/>
-                    <a:cs typeface="+mj-cs"/>
-                  </a:rPr>
-                  <a:t>its superior predictions and execution </a:t>
-                </a:r>
-                <a:r>
-                  <a:rPr kumimoji="1" lang="en-US" sz="3200" dirty="0" smtClean="0">
-                    <a:solidFill>
-                      <a:schemeClr val="bg1"/>
-                    </a:solidFill>
-                    <a:latin typeface="+mj-lt"/>
-                    <a:ea typeface="+mj-ea"/>
-                    <a:cs typeface="+mj-cs"/>
-                  </a:rPr>
-                  <a:t>speed </a:t>
-                </a:r>
-                <a:r>
-                  <a:rPr kumimoji="1" lang="en-US" sz="3200" dirty="0" smtClean="0">
-                    <a:solidFill>
-                      <a:schemeClr val="bg1"/>
-                    </a:solidFill>
-                    <a:latin typeface="+mj-lt"/>
-                    <a:ea typeface="+mj-ea"/>
-                    <a:cs typeface="+mj-cs"/>
-                  </a:rPr>
-                  <a:t>in </a:t>
-                </a:r>
-                <a:r>
-                  <a:rPr kumimoji="1" lang="en-US" sz="3200" dirty="0" smtClean="0">
-                    <a:solidFill>
-                      <a:schemeClr val="bg1"/>
-                    </a:solidFill>
-                    <a:latin typeface="+mj-lt"/>
-                    <a:ea typeface="+mj-ea"/>
-                    <a:cs typeface="+mj-cs"/>
-                  </a:rPr>
-                  <a:t>tests, Gaussian process regression was pursued </a:t>
-                </a:r>
-                <a:r>
-                  <a:rPr kumimoji="1" lang="en-US" sz="3200" dirty="0" smtClean="0">
-                    <a:solidFill>
-                      <a:schemeClr val="bg1"/>
-                    </a:solidFill>
-                    <a:latin typeface="+mj-lt"/>
-                    <a:ea typeface="+mj-ea"/>
-                    <a:cs typeface="+mj-cs"/>
-                  </a:rPr>
-                  <a:t>further and implemented </a:t>
-                </a:r>
-                <a:r>
-                  <a:rPr kumimoji="1" lang="en-US" sz="3200" dirty="0" smtClean="0">
-                    <a:solidFill>
-                      <a:schemeClr val="bg1"/>
-                    </a:solidFill>
-                    <a:latin typeface="+mj-lt"/>
-                    <a:ea typeface="+mj-ea"/>
-                    <a:cs typeface="+mj-cs"/>
-                  </a:rPr>
-                  <a:t>in simulation.</a:t>
+                  <a:t>. Because of its superior predictions and execution speed in tests, Gaussian process regression was pursued further and implemented in simulation.</a:t>
                 </a:r>
               </a:p>
             </p:txBody>
           </p:sp>
         </mc:Choice>
-        <mc:Fallback>
+        <mc:Fallback xmlns="">
           <p:sp>
             <p:nvSpPr>
               <p:cNvPr id="1041" name="Text Box 74"/>
@@ -7087,7 +7021,30 @@
                   <a:ea typeface="+mj-ea"/>
                   <a:cs typeface="+mj-cs"/>
                 </a:rPr>
-                <a:t>Success!!!</a:t>
+                <a:t>Success</a:t>
+              </a:r>
+              <a:r>
+                <a:rPr kumimoji="1" lang="en-US" sz="3200" dirty="0" smtClean="0">
+                  <a:solidFill>
+                    <a:schemeClr val="bg1"/>
+                  </a:solidFill>
+                  <a:latin typeface="+mj-lt"/>
+                  <a:ea typeface="+mj-ea"/>
+                  <a:cs typeface="+mj-cs"/>
+                </a:rPr>
+                <a:t>!!! (Tempered with appropriate disclaimers… </a:t>
+              </a:r>
+              <a:r>
+                <a:rPr kumimoji="1" lang="en-US" sz="3200" dirty="0" smtClean="0">
+                  <a:solidFill>
+                    <a:schemeClr val="bg1"/>
+                  </a:solidFill>
+                  <a:latin typeface="+mj-lt"/>
+                  <a:ea typeface="+mj-ea"/>
+                  <a:cs typeface="+mj-cs"/>
+                  <a:sym typeface="Wingdings" panose="05000000000000000000" pitchFamily="2" charset="2"/>
+                </a:rPr>
+                <a:t>).</a:t>
               </a:r>
               <a:endParaRPr kumimoji="1" lang="en-US" sz="3200" dirty="0">
                 <a:solidFill>
@@ -7876,7 +7833,7 @@
             <p:spPr bwMode="auto">
               <a:xfrm>
                 <a:off x="29641800" y="6400800"/>
-                <a:ext cx="13182600" cy="3618589"/>
+                <a:ext cx="13182600" cy="2648241"/>
               </a:xfrm>
               <a:prstGeom prst="rect">
                 <a:avLst/>
@@ -7919,11 +7876,16 @@
                 </a:endParaRPr>
               </a:p>
               <a:p>
-                <a:pPr algn="ctr" defTabSz="4389438">
+                <a:pPr algn="just" defTabSz="4389438">
                   <a:defRPr/>
                 </a:pPr>
-                <a:endParaRPr lang="en-US" sz="3200" b="1" u="sng" dirty="0">
-                  <a:cs typeface="Arial" charset="0"/>
+                <a:endParaRPr kumimoji="1" lang="en-CA" sz="3200" dirty="0" smtClean="0">
+                  <a:solidFill>
+                    <a:schemeClr val="bg1"/>
+                  </a:solidFill>
+                  <a:latin typeface="+mj-lt"/>
+                  <a:ea typeface="+mj-ea"/>
+                  <a:cs typeface="+mj-cs"/>
                 </a:endParaRPr>
               </a:p>
               <a:p>
@@ -7931,7 +7893,7 @@
                   <a:defRPr/>
                 </a:pPr>
                 <a:r>
-                  <a:rPr kumimoji="1" lang="en-US" sz="3200" dirty="0" smtClean="0">
+                  <a:rPr kumimoji="1" lang="en-CA" sz="3200" dirty="0" smtClean="0">
                     <a:solidFill>
                       <a:schemeClr val="bg1"/>
                     </a:solidFill>
@@ -7939,7 +7901,7 @@
                     <a:ea typeface="+mj-ea"/>
                     <a:cs typeface="+mj-cs"/>
                   </a:rPr>
-                  <a:t>OVERVIEW OF METHODS EXPLORED: </a:t>
+                  <a:t>Under </a:t>
                 </a:r>
                 <a:r>
                   <a:rPr kumimoji="1" lang="en-CA" sz="3200" dirty="0">
@@ -7950,7 +7912,18 @@
                     <a:ea typeface="+mj-ea"/>
                     <a:cs typeface="+mj-cs"/>
                   </a:rPr>
-                  <a:t>Under the centroid method, the UAV circles the estimated thermal center at a fixed radius. One improvement on this method is to develop strategies for extracting energy from the thermal that are more flexible. We investigated three approaches to achieve this with machine learning: tabled-based Q learning, neural fitted Q learning, and dynamic programming with neural interpolation. Tabled-based Q learning discretizes the state space, and develops estimates for the value of performing each possible action in each discretized chunk using Q learning. We used this method successfully in a highly idealized setting, but we had some difficulty in using it to scale it up. Future work could include focusing on variable chunking size, allowing for better scaling. Neural-fitted Q learning also uses Q learning, but stores value estimates using a neural network. We had only limited success with this method, and future work would focus on incorporating new information into a neural network without losing the old information stored. Dynamic programming with neural interpolation is a model based method, using a model of the system to carry out dynamic programming. To allow for a continuously varying policy, the value estimates and policy estimates are both stored in neural networks. </a:t>
+                  <a:t>the centroid method, the UAV circles the estimated thermal center at a fixed radius. </a:t>
+                </a:r>
+                <a:r>
+                  <a:rPr kumimoji="1" lang="en-CA" sz="3200" dirty="0">
+                    <a:solidFill>
+                      <a:schemeClr val="bg1"/>
+                    </a:solidFill>
+                    <a:latin typeface="+mj-lt"/>
+                    <a:ea typeface="+mj-ea"/>
+                    <a:cs typeface="+mj-cs"/>
+                  </a:rPr>
+                  <a:t>We wanted to develop a more flexible orbiting strategy. We tried to do this three different ways, all using machine learning: table-based Q-learning, neural fitted Q-learning, and dynamic programming with neural interpolation. Table-based Q-learning discretizes the state space, and estimates the value of each possible action in each state space chunk. We used this method successfully in a low dimensional setting, but we had difficulty scaling it up. Neural-fitted Q-learning uses a neural network to stores value estimates, but we had difficulty properly incorporating new information into the neural network. Dynamic programming with neural interpolation uses a system model to simulate interactions. To allow for a continuously varying policy, we store the resulting value and policy estimates using neural networks.</a:t>
                 </a:r>
                 <a:endParaRPr kumimoji="1" lang="en-US" sz="3200" dirty="0">
                   <a:solidFill>
@@ -7966,53 +7939,6 @@
         </p:grpSp>
         <p:sp>
           <p:nvSpPr>
-            <p:cNvPr id="1115" name="TextBox 136"/>
-            <p:cNvSpPr txBox="1">
-              <a:spLocks noChangeArrowheads="1"/>
-            </p:cNvSpPr>
-            <p:nvPr/>
-          </p:nvSpPr>
-          <p:spPr bwMode="auto">
-            <a:xfrm>
-              <a:off x="30403800" y="19354800"/>
-              <a:ext cx="11658600" cy="400050"/>
-            </a:xfrm>
-            <a:prstGeom prst="rect">
-              <a:avLst/>
-            </a:prstGeom>
-            <a:noFill/>
-            <a:ln w="9525">
-              <a:noFill/>
-              <a:miter lim="800000"/>
-              <a:headEnd/>
-              <a:tailEnd/>
-            </a:ln>
-          </p:spPr>
-          <p:txBody>
-            <a:bodyPr>
-              <a:spAutoFit/>
-            </a:bodyPr>
-            <a:lstStyle/>
-            <a:p>
-              <a:pPr algn="ctr">
-                <a:defRPr/>
-              </a:pPr>
-              <a:r>
-                <a:rPr kumimoji="1" lang="en-US" sz="2000" dirty="0">
-                  <a:solidFill>
-                    <a:schemeClr val="bg1"/>
-                  </a:solidFill>
-                  <a:latin typeface="+mj-lt"/>
-                  <a:ea typeface="+mj-ea"/>
-                  <a:cs typeface="+mj-cs"/>
-                </a:rPr>
-                <a:t>Figure 3: Example of RISA’s Output</a:t>
-              </a:r>
-            </a:p>
-          </p:txBody>
-        </p:sp>
-        <p:sp>
-          <p:nvSpPr>
             <p:cNvPr id="5" name="TextBox 137"/>
             <p:cNvSpPr txBox="1">
               <a:spLocks noChangeArrowheads="1"/>
@@ -8021,8 +7947,8 @@
           </p:nvSpPr>
           <p:spPr bwMode="auto">
             <a:xfrm>
-              <a:off x="29679900" y="23703274"/>
-              <a:ext cx="13030200" cy="3046988"/>
+              <a:off x="29758558" y="23267335"/>
+              <a:ext cx="13030200" cy="3539430"/>
             </a:xfrm>
             <a:prstGeom prst="rect">
               <a:avLst/>
@@ -8045,6 +7971,17 @@
                 <a:defRPr/>
               </a:pPr>
               <a:r>
+                <a:rPr kumimoji="1" lang="en-CA" sz="3200" dirty="0" smtClean="0">
+                  <a:solidFill>
+                    <a:schemeClr val="bg1"/>
+                  </a:solidFill>
+                  <a:latin typeface="+mj-lt"/>
+                  <a:ea typeface="+mj-ea"/>
+                  <a:cs typeface="+mj-cs"/>
+                </a:rPr>
+                <a:t>RESULTS. Using </a:t>
+              </a:r>
+              <a:r>
                 <a:rPr kumimoji="1" lang="en-CA" sz="3200" dirty="0">
                   <a:solidFill>
                     <a:schemeClr val="bg1"/>
@@ -8053,7 +7990,7 @@
                   <a:ea typeface="+mj-ea"/>
                   <a:cs typeface="+mj-cs"/>
                 </a:rPr>
-                <a:t>RESULTS: </a:t>
+                <a:t>dynamic programming with neural interpolation, the learning agent </a:t>
               </a:r>
               <a:r>
                 <a:rPr kumimoji="1" lang="en-CA" sz="3200" dirty="0" smtClean="0">
@@ -8064,7 +8001,7 @@
                   <a:ea typeface="+mj-ea"/>
                   <a:cs typeface="+mj-cs"/>
                 </a:rPr>
-                <a:t>We </a:t>
+                <a:t>learned </a:t>
               </a:r>
               <a:r>
                 <a:rPr kumimoji="1" lang="en-CA" sz="3200" dirty="0">
@@ -8075,29 +8012,7 @@
                   <a:ea typeface="+mj-ea"/>
                   <a:cs typeface="+mj-cs"/>
                 </a:rPr>
-                <a:t>had the most success using dynamic programming with neural interpolation. A plausible and flexible policy was developed that adjusts to thermal position and shape. State variables used were: position from center of thermal, height of UAV, and direction of UAV. Current work is focused on testing the algorithms developed in the more sophisticated </a:t>
-              </a:r>
-              <a:r>
-                <a:rPr kumimoji="1" lang="en-CA" sz="3200" dirty="0" err="1">
-                  <a:solidFill>
-                    <a:schemeClr val="bg1"/>
-                  </a:solidFill>
-                  <a:latin typeface="+mj-lt"/>
-                  <a:ea typeface="+mj-ea"/>
-                  <a:cs typeface="+mj-cs"/>
-                </a:rPr>
-                <a:t>ccrcsim</a:t>
-              </a:r>
-              <a:r>
-                <a:rPr kumimoji="1" lang="en-CA" sz="3200" dirty="0">
-                  <a:solidFill>
-                    <a:schemeClr val="bg1"/>
-                  </a:solidFill>
-                  <a:latin typeface="+mj-lt"/>
-                  <a:ea typeface="+mj-ea"/>
-                  <a:cs typeface="+mj-cs"/>
-                </a:rPr>
-                <a:t> simulator.</a:t>
+                <a:t>a plausible and flexible policy, which adjusted in response to thermal position and shape. This was carried out in an idealized environment, with the following state variables: distance from center of thermal, height of UAV, and direction of UAV. Current work is focused on testing the developed algorithms in the more sophisticated CRRCSim simulator.</a:t>
               </a:r>
             </a:p>
           </p:txBody>
@@ -8111,8 +8026,8 @@
         </p:nvSpPr>
         <p:spPr>
           <a:xfrm>
-            <a:off x="31775400" y="22725543"/>
-            <a:ext cx="8839200" cy="1015663"/>
+            <a:off x="29565600" y="22020213"/>
+            <a:ext cx="13223158" cy="1015663"/>
           </a:xfrm>
           <a:prstGeom prst="rect">
             <a:avLst/>
@@ -8137,7 +8052,105 @@
                 <a:ea typeface="+mj-ea"/>
                 <a:cs typeface="+mj-cs"/>
               </a:rPr>
-              <a:t>Figure 4: Value and policy estimates with thermal at 5. In the policy plot, blue = travel towards origin, green = travel away from origin, and red = orbit.</a:t>
+              <a:t>Figure 4</a:t>
+            </a:r>
+            <a:r>
+              <a:rPr kumimoji="1" lang="en-US" sz="2000" dirty="0" smtClean="0">
+                <a:solidFill>
+                  <a:schemeClr val="bg1"/>
+                </a:solidFill>
+                <a:latin typeface="+mj-lt"/>
+                <a:ea typeface="+mj-ea"/>
+                <a:cs typeface="+mj-cs"/>
+              </a:rPr>
+              <a:t>: </a:t>
+            </a:r>
+            <a:r>
+              <a:rPr kumimoji="1" lang="en-US" sz="2000" dirty="0" smtClean="0">
+                <a:solidFill>
+                  <a:schemeClr val="bg1"/>
+                </a:solidFill>
+                <a:latin typeface="+mj-lt"/>
+                <a:ea typeface="+mj-ea"/>
+                <a:cs typeface="+mj-cs"/>
+              </a:rPr>
+              <a:t>Value and policy estimates with thermal at </a:t>
+            </a:r>
+            <a:r>
+              <a:rPr kumimoji="1" lang="en-US" sz="2000" dirty="0" smtClean="0">
+                <a:solidFill>
+                  <a:schemeClr val="bg1"/>
+                </a:solidFill>
+                <a:latin typeface="+mj-lt"/>
+                <a:ea typeface="+mj-ea"/>
+                <a:cs typeface="+mj-cs"/>
+              </a:rPr>
+              <a:t>5, where the UAV is facing the thermal center. </a:t>
+            </a:r>
+          </a:p>
+          <a:p>
+            <a:pPr algn="ctr">
+              <a:defRPr/>
+            </a:pPr>
+            <a:r>
+              <a:rPr kumimoji="1" lang="en-US" sz="2000" dirty="0" smtClean="0">
+                <a:solidFill>
+                  <a:schemeClr val="bg1"/>
+                </a:solidFill>
+                <a:latin typeface="+mj-lt"/>
+                <a:ea typeface="+mj-ea"/>
+                <a:cs typeface="+mj-cs"/>
+              </a:rPr>
+              <a:t>In the value plot (above), the legend refers to the UAV height. </a:t>
+            </a:r>
+          </a:p>
+          <a:p>
+            <a:pPr algn="ctr">
+              <a:defRPr/>
+            </a:pPr>
+            <a:r>
+              <a:rPr kumimoji="1" lang="en-US" sz="2000" dirty="0" smtClean="0">
+                <a:solidFill>
+                  <a:schemeClr val="bg1"/>
+                </a:solidFill>
+                <a:latin typeface="+mj-lt"/>
+                <a:ea typeface="+mj-ea"/>
+                <a:cs typeface="+mj-cs"/>
+              </a:rPr>
+              <a:t>In </a:t>
+            </a:r>
+            <a:r>
+              <a:rPr kumimoji="1" lang="en-US" sz="2000" dirty="0" smtClean="0">
+                <a:solidFill>
+                  <a:schemeClr val="bg1"/>
+                </a:solidFill>
+                <a:latin typeface="+mj-lt"/>
+                <a:ea typeface="+mj-ea"/>
+                <a:cs typeface="+mj-cs"/>
+              </a:rPr>
+              <a:t>the policy </a:t>
+            </a:r>
+            <a:r>
+              <a:rPr kumimoji="1" lang="en-US" sz="2000" dirty="0" smtClean="0">
+                <a:solidFill>
+                  <a:schemeClr val="bg1"/>
+                </a:solidFill>
+                <a:latin typeface="+mj-lt"/>
+                <a:ea typeface="+mj-ea"/>
+                <a:cs typeface="+mj-cs"/>
+              </a:rPr>
+              <a:t>plot (below), </a:t>
+            </a:r>
+            <a:r>
+              <a:rPr kumimoji="1" lang="en-US" sz="2000" dirty="0" smtClean="0">
+                <a:solidFill>
+                  <a:schemeClr val="bg1"/>
+                </a:solidFill>
+                <a:latin typeface="+mj-lt"/>
+                <a:ea typeface="+mj-ea"/>
+                <a:cs typeface="+mj-cs"/>
+              </a:rPr>
+              <a:t>blue = travel towards origin, green = travel away from origin, and red = orbit.</a:t>
             </a:r>
             <a:endParaRPr kumimoji="1" lang="en-US" sz="2000" dirty="0">
               <a:solidFill>
@@ -8334,7 +8347,7 @@
       </p:sp>
       <p:pic>
         <p:nvPicPr>
-          <p:cNvPr id="7" name="Picture 6"/>
+          <p:cNvPr id="10" name="Picture 9"/>
           <p:cNvPicPr>
             <a:picLocks noChangeAspect="1"/>
           </p:cNvPicPr>
@@ -8348,8 +8361,8 @@
         </p:blipFill>
         <p:spPr>
           <a:xfrm>
-            <a:off x="30990600" y="14315108"/>
-            <a:ext cx="10824150" cy="8087784"/>
+            <a:off x="31116851" y="14346524"/>
+            <a:ext cx="10120656" cy="7673689"/>
           </a:xfrm>
           <a:prstGeom prst="rect">
             <a:avLst/>

</xml_diff>

<commit_message>
Edited David poster part. Sketched conclusion outline.
</commit_message>
<xml_diff>
--- a/Poster.pptx
+++ b/Poster.pptx
@@ -247,7 +247,7 @@
               <a:pPr>
                 <a:defRPr/>
               </a:pPr>
-              <a:t>5/30/2016</a:t>
+              <a:t>5/31/2016</a:t>
             </a:fld>
             <a:endParaRPr lang="en-US"/>
           </a:p>
@@ -6898,10 +6898,10 @@
         </p:nvGrpSpPr>
         <p:grpSpPr bwMode="auto">
           <a:xfrm>
-            <a:off x="29565600" y="27736800"/>
-            <a:ext cx="13335000" cy="4335463"/>
+            <a:off x="29565600" y="27736802"/>
+            <a:ext cx="13335000" cy="4414876"/>
             <a:chOff x="29565600" y="13716000"/>
-            <a:chExt cx="13335000" cy="7544434"/>
+            <a:chExt cx="13335000" cy="7682624"/>
           </a:xfrm>
         </p:grpSpPr>
         <p:sp>
@@ -6967,8 +6967,8 @@
           </p:nvSpPr>
           <p:spPr bwMode="auto">
             <a:xfrm>
-              <a:off x="29794200" y="13793350"/>
-              <a:ext cx="12954000" cy="2463681"/>
+              <a:off x="29794200" y="13793349"/>
+              <a:ext cx="12954000" cy="7605275"/>
             </a:xfrm>
             <a:prstGeom prst="rect">
               <a:avLst/>
@@ -6994,7 +6994,7 @@
                 <a:defRPr/>
               </a:pPr>
               <a:r>
-                <a:rPr kumimoji="1" lang="en-US" sz="3800" u="sng" dirty="0">
+                <a:rPr kumimoji="1" lang="en-US" sz="3800" u="sng" dirty="0" smtClean="0">
                   <a:solidFill>
                     <a:schemeClr val="bg1"/>
                   </a:solidFill>
@@ -7021,8 +7021,16 @@
                   <a:ea typeface="+mj-ea"/>
                   <a:cs typeface="+mj-cs"/>
                 </a:rPr>
-                <a:t>Success</a:t>
+                <a:t>-Successfully implemented basic energy / centroid algorithm works</a:t>
               </a:r>
+            </a:p>
+            <a:p>
+              <a:pPr algn="just" defTabSz="4389438">
+                <a:spcBef>
+                  <a:spcPct val="50000"/>
+                </a:spcBef>
+                <a:defRPr/>
+              </a:pPr>
               <a:r>
                 <a:rPr kumimoji="1" lang="en-US" sz="3200" dirty="0" smtClean="0">
                   <a:solidFill>
@@ -7032,8 +7040,16 @@
                   <a:ea typeface="+mj-ea"/>
                   <a:cs typeface="+mj-cs"/>
                 </a:rPr>
-                <a:t>!!! (Tempered with appropriate disclaimers… </a:t>
+                <a:t>-Gaussian process regression was successfully use to identify non-ideal thermals and circle them in the CRRCSIM simulator.</a:t>
               </a:r>
+            </a:p>
+            <a:p>
+              <a:pPr defTabSz="4389438">
+                <a:spcBef>
+                  <a:spcPct val="50000"/>
+                </a:spcBef>
+                <a:defRPr/>
+              </a:pPr>
               <a:r>
                 <a:rPr kumimoji="1" lang="en-US" sz="3200" dirty="0" smtClean="0">
                   <a:solidFill>
@@ -7042,10 +7058,19 @@
                   <a:latin typeface="+mj-lt"/>
                   <a:ea typeface="+mj-ea"/>
                   <a:cs typeface="+mj-cs"/>
-                  <a:sym typeface="Wingdings" panose="05000000000000000000" pitchFamily="2" charset="2"/>
                 </a:rPr>
-                <a:t>).</a:t>
+                <a:t>-Dynamic programming with neural interpolation was successfully used to develop an adaptive policy in a simplified environment.</a:t>
               </a:r>
+              <a:br>
+                <a:rPr kumimoji="1" lang="en-US" sz="3200" dirty="0" smtClean="0">
+                  <a:solidFill>
+                    <a:schemeClr val="bg1"/>
+                  </a:solidFill>
+                  <a:latin typeface="+mj-lt"/>
+                  <a:ea typeface="+mj-ea"/>
+                  <a:cs typeface="+mj-cs"/>
+                </a:rPr>
+              </a:br>
               <a:endParaRPr kumimoji="1" lang="en-US" sz="3200" dirty="0">
                 <a:solidFill>
                   <a:schemeClr val="bg1"/>
@@ -7833,7 +7858,7 @@
             <p:spPr bwMode="auto">
               <a:xfrm>
                 <a:off x="29641800" y="6400800"/>
-                <a:ext cx="13182600" cy="2648241"/>
+                <a:ext cx="13182600" cy="2486516"/>
               </a:xfrm>
               <a:prstGeom prst="rect">
                 <a:avLst/>
@@ -7912,7 +7937,18 @@
                     <a:ea typeface="+mj-ea"/>
                     <a:cs typeface="+mj-cs"/>
                   </a:rPr>
-                  <a:t>the centroid method, the UAV circles the estimated thermal center at a fixed radius. </a:t>
+                  <a:t>the centroid method, </a:t>
+                </a:r>
+                <a:r>
+                  <a:rPr kumimoji="1" lang="en-CA" sz="3200" dirty="0" smtClean="0">
+                    <a:solidFill>
+                      <a:schemeClr val="bg1"/>
+                    </a:solidFill>
+                    <a:latin typeface="+mj-lt"/>
+                    <a:ea typeface="+mj-ea"/>
+                    <a:cs typeface="+mj-cs"/>
+                  </a:rPr>
+                  <a:t>the flexibility of the energy extraction strategy is limited. We </a:t>
                 </a:r>
                 <a:r>
                   <a:rPr kumimoji="1" lang="en-CA" sz="3200" dirty="0">
@@ -7923,7 +7959,29 @@
                     <a:ea typeface="+mj-ea"/>
                     <a:cs typeface="+mj-cs"/>
                   </a:rPr>
-                  <a:t>We wanted to develop a more flexible orbiting strategy. We tried to do this three different ways, all using machine learning: table-based Q-learning, neural fitted Q-learning, and dynamic programming with neural interpolation. Table-based Q-learning discretizes the state space, and estimates the value of each possible action in each state space chunk. We used this method successfully in a low dimensional setting, but we had difficulty scaling it up. Neural-fitted Q-learning uses a neural network to stores value estimates, but we had difficulty properly incorporating new information into the neural network. Dynamic programming with neural interpolation uses a system model to simulate interactions. To allow for a continuously varying policy, we store the resulting value and policy estimates using neural networks.</a:t>
+                  <a:t>tried to </a:t>
+                </a:r>
+                <a:r>
+                  <a:rPr kumimoji="1" lang="en-CA" sz="3200" dirty="0" smtClean="0">
+                    <a:solidFill>
+                      <a:schemeClr val="bg1"/>
+                    </a:solidFill>
+                    <a:latin typeface="+mj-lt"/>
+                    <a:ea typeface="+mj-ea"/>
+                    <a:cs typeface="+mj-cs"/>
+                  </a:rPr>
+                  <a:t>create a more flexible strategy in three ways</a:t>
+                </a:r>
+                <a:r>
+                  <a:rPr kumimoji="1" lang="en-CA" sz="3200" dirty="0">
+                    <a:solidFill>
+                      <a:schemeClr val="bg1"/>
+                    </a:solidFill>
+                    <a:latin typeface="+mj-lt"/>
+                    <a:ea typeface="+mj-ea"/>
+                    <a:cs typeface="+mj-cs"/>
+                  </a:rPr>
+                  <a:t>, all using machine learning: table-based Q-learning, neural fitted Q-learning, and dynamic programming with neural interpolation. Table-based Q-learning discretizes the state space, and estimates the value of each possible action in each state space chunk. We used this method successfully in a low dimensional setting, but we had difficulty scaling it up. Neural-fitted Q-learning uses a neural network to stores value estimates, but we had difficulty properly incorporating new information into the neural network. Dynamic programming with neural interpolation uses a system model to simulate interactions. To allow for a continuously varying policy, we store the resulting value and policy estimates using neural networks.</a:t>
                 </a:r>
                 <a:endParaRPr kumimoji="1" lang="en-US" sz="3200" dirty="0">
                   <a:solidFill>
@@ -8012,8 +8070,49 @@
                   <a:ea typeface="+mj-ea"/>
                   <a:cs typeface="+mj-cs"/>
                 </a:rPr>
-                <a:t>a plausible and flexible policy, which adjusted in response to thermal position and shape. This was carried out in an idealized environment, with the following state variables: distance from center of thermal, height of UAV, and direction of UAV. Current work is focused on testing the developed algorithms in the more sophisticated CRRCSim simulator.</a:t>
+                <a:t>a plausible and flexible policy, which adjusted in response to thermal position and shape. This was carried out in an idealized environment, with the following state variables: distance from center of thermal, height of UAV, and direction of UAV. Current work is focused on testing the developed algorithms in the more sophisticated </a:t>
               </a:r>
+              <a:r>
+                <a:rPr kumimoji="1" lang="en-CA" sz="3200" dirty="0" err="1">
+                  <a:solidFill>
+                    <a:schemeClr val="bg1"/>
+                  </a:solidFill>
+                  <a:latin typeface="+mj-lt"/>
+                  <a:ea typeface="+mj-ea"/>
+                  <a:cs typeface="+mj-cs"/>
+                </a:rPr>
+                <a:t>CRRCSim</a:t>
+              </a:r>
+              <a:r>
+                <a:rPr kumimoji="1" lang="en-CA" sz="3200" dirty="0">
+                  <a:solidFill>
+                    <a:schemeClr val="bg1"/>
+                  </a:solidFill>
+                  <a:latin typeface="+mj-lt"/>
+                  <a:ea typeface="+mj-ea"/>
+                  <a:cs typeface="+mj-cs"/>
+                </a:rPr>
+                <a:t> </a:t>
+              </a:r>
+              <a:r>
+                <a:rPr kumimoji="1" lang="en-CA" sz="3200" dirty="0" smtClean="0">
+                  <a:solidFill>
+                    <a:schemeClr val="bg1"/>
+                  </a:solidFill>
+                  <a:latin typeface="+mj-lt"/>
+                  <a:ea typeface="+mj-ea"/>
+                  <a:cs typeface="+mj-cs"/>
+                </a:rPr>
+                <a:t>simulator, with additional states and additional actions.</a:t>
+              </a:r>
+              <a:endParaRPr kumimoji="1" lang="en-CA" sz="3200" dirty="0">
+                <a:solidFill>
+                  <a:schemeClr val="bg1"/>
+                </a:solidFill>
+                <a:latin typeface="+mj-lt"/>
+                <a:ea typeface="+mj-ea"/>
+                <a:cs typeface="+mj-cs"/>
+              </a:endParaRPr>
             </a:p>
           </p:txBody>
         </p:sp>
@@ -8052,7 +8151,7 @@
                 <a:ea typeface="+mj-ea"/>
                 <a:cs typeface="+mj-cs"/>
               </a:rPr>
-              <a:t>Figure 4</a:t>
+              <a:t>Figure 4: Value and policy estimates with thermal at 5, </a:t>
             </a:r>
             <a:r>
               <a:rPr kumimoji="1" lang="en-US" sz="2000" dirty="0" smtClean="0">
@@ -8063,7 +8162,7 @@
                 <a:ea typeface="+mj-ea"/>
                 <a:cs typeface="+mj-cs"/>
               </a:rPr>
-              <a:t>: </a:t>
+              <a:t>and with the </a:t>
             </a:r>
             <a:r>
               <a:rPr kumimoji="1" lang="en-US" sz="2000" dirty="0" smtClean="0">
@@ -8074,7 +8173,7 @@
                 <a:ea typeface="+mj-ea"/>
                 <a:cs typeface="+mj-cs"/>
               </a:rPr>
-              <a:t>Value and policy estimates with thermal at </a:t>
+              <a:t>UAV </a:t>
             </a:r>
             <a:r>
               <a:rPr kumimoji="1" lang="en-US" sz="2000" dirty="0" smtClean="0">
@@ -8085,8 +8184,38 @@
                 <a:ea typeface="+mj-ea"/>
                 <a:cs typeface="+mj-cs"/>
               </a:rPr>
-              <a:t>5, where the UAV is facing the thermal center. </a:t>
-            </a:r>
+              <a:t>facing </a:t>
+            </a:r>
+            <a:r>
+              <a:rPr kumimoji="1" lang="en-US" sz="2000" dirty="0" smtClean="0">
+                <a:solidFill>
+                  <a:schemeClr val="bg1"/>
+                </a:solidFill>
+                <a:latin typeface="+mj-lt"/>
+                <a:ea typeface="+mj-ea"/>
+                <a:cs typeface="+mj-cs"/>
+              </a:rPr>
+              <a:t>the </a:t>
+            </a:r>
+            <a:r>
+              <a:rPr kumimoji="1" lang="en-US" sz="2000" dirty="0" smtClean="0">
+                <a:solidFill>
+                  <a:schemeClr val="bg1"/>
+                </a:solidFill>
+                <a:latin typeface="+mj-lt"/>
+                <a:ea typeface="+mj-ea"/>
+                <a:cs typeface="+mj-cs"/>
+              </a:rPr>
+              <a:t>origin. </a:t>
+            </a:r>
+            <a:endParaRPr kumimoji="1" lang="en-US" sz="2000" dirty="0" smtClean="0">
+              <a:solidFill>
+                <a:schemeClr val="bg1"/>
+              </a:solidFill>
+              <a:latin typeface="+mj-lt"/>
+              <a:ea typeface="+mj-ea"/>
+              <a:cs typeface="+mj-cs"/>
+            </a:endParaRPr>
           </a:p>
           <a:p>
             <a:pPr algn="ctr">
@@ -8117,40 +8246,7 @@
                 <a:ea typeface="+mj-ea"/>
                 <a:cs typeface="+mj-cs"/>
               </a:rPr>
-              <a:t>In </a:t>
-            </a:r>
-            <a:r>
-              <a:rPr kumimoji="1" lang="en-US" sz="2000" dirty="0" smtClean="0">
-                <a:solidFill>
-                  <a:schemeClr val="bg1"/>
-                </a:solidFill>
-                <a:latin typeface="+mj-lt"/>
-                <a:ea typeface="+mj-ea"/>
-                <a:cs typeface="+mj-cs"/>
-              </a:rPr>
-              <a:t>the policy </a:t>
-            </a:r>
-            <a:r>
-              <a:rPr kumimoji="1" lang="en-US" sz="2000" dirty="0" smtClean="0">
-                <a:solidFill>
-                  <a:schemeClr val="bg1"/>
-                </a:solidFill>
-                <a:latin typeface="+mj-lt"/>
-                <a:ea typeface="+mj-ea"/>
-                <a:cs typeface="+mj-cs"/>
-              </a:rPr>
-              <a:t>plot (below), </a:t>
-            </a:r>
-            <a:r>
-              <a:rPr kumimoji="1" lang="en-US" sz="2000" dirty="0" smtClean="0">
-                <a:solidFill>
-                  <a:schemeClr val="bg1"/>
-                </a:solidFill>
-                <a:latin typeface="+mj-lt"/>
-                <a:ea typeface="+mj-ea"/>
-                <a:cs typeface="+mj-cs"/>
-              </a:rPr>
-              <a:t>blue = travel towards origin, green = travel away from origin, and red = orbit.</a:t>
+              <a:t>In the policy plot (below), blue = travel towards origin, green = travel away from origin, and red = orbit.</a:t>
             </a:r>
             <a:endParaRPr kumimoji="1" lang="en-US" sz="2000" dirty="0">
               <a:solidFill>
@@ -8361,8 +8457,8 @@
         </p:blipFill>
         <p:spPr>
           <a:xfrm>
-            <a:off x="31116851" y="14346524"/>
-            <a:ext cx="10120656" cy="7673689"/>
+            <a:off x="30917075" y="14016551"/>
+            <a:ext cx="10555850" cy="8003662"/>
           </a:xfrm>
           <a:prstGeom prst="rect">
             <a:avLst/>

</xml_diff>

<commit_message>
Reworked intro, conclusion. Edited David's stuff. Small edits to Travis's and Garrett's parts.
</commit_message>
<xml_diff>
--- a/Poster.pptx
+++ b/Poster.pptx
@@ -925,7 +925,7 @@
         <a:lstStyle/>
         <a:p>
           <a:r>
-            <a:rPr lang="en-US"/>
+            <a:rPr lang="en-US" dirty="0"/>
             <a:t>Gather Data</a:t>
           </a:r>
         </a:p>
@@ -1235,7 +1235,7 @@
   <dgm:whole/>
   <dgm:extLst>
     <a:ext uri="http://schemas.microsoft.com/office/drawing/2008/diagram">
-      <dsp:dataModelExt xmlns:dsp="http://schemas.microsoft.com/office/drawing/2008/diagram" relId="rId14" minVer="http://schemas.openxmlformats.org/drawingml/2006/diagram"/>
+      <dsp:dataModelExt xmlns:dsp="http://schemas.microsoft.com/office/drawing/2008/diagram" relId="rId13" minVer="http://schemas.openxmlformats.org/drawingml/2006/diagram"/>
     </a:ext>
   </dgm:extLst>
 </dgm:dataModel>
@@ -1392,7 +1392,7 @@
             </a:spcAft>
           </a:pPr>
           <a:r>
-            <a:rPr lang="en-US" sz="1800" kern="1200"/>
+            <a:rPr lang="en-US" sz="1800" kern="1200" dirty="0"/>
             <a:t>Gather Data</a:t>
           </a:r>
         </a:p>
@@ -3305,7 +3305,7 @@
             <a:pPr>
               <a:defRPr/>
             </a:pPr>
-            <a:endParaRPr lang="en-US"/>
+            <a:endParaRPr lang="en-US" dirty="0"/>
           </a:p>
         </p:txBody>
       </p:sp>
@@ -3344,9 +3344,9 @@
               <a:pPr>
                 <a:defRPr/>
               </a:pPr>
-              <a:t>6/3/2016</a:t>
+              <a:t>6/5/2016</a:t>
             </a:fld>
-            <a:endParaRPr lang="en-US"/>
+            <a:endParaRPr lang="en-US" dirty="0"/>
           </a:p>
         </p:txBody>
       </p:sp>
@@ -3380,7 +3380,7 @@
           <a:lstStyle/>
           <a:p>
             <a:pPr lvl="0"/>
-            <a:endParaRPr lang="en-US" noProof="0" smtClean="0"/>
+            <a:endParaRPr lang="en-US" noProof="0" dirty="0" smtClean="0"/>
           </a:p>
         </p:txBody>
       </p:sp>
@@ -3475,7 +3475,7 @@
             <a:pPr>
               <a:defRPr/>
             </a:pPr>
-            <a:endParaRPr lang="en-US"/>
+            <a:endParaRPr lang="en-US" dirty="0"/>
           </a:p>
         </p:txBody>
       </p:sp>
@@ -3516,7 +3516,7 @@
               </a:pPr>
               <a:t>‹#›</a:t>
             </a:fld>
-            <a:endParaRPr lang="en-US"/>
+            <a:endParaRPr lang="en-US" dirty="0"/>
           </a:p>
         </p:txBody>
       </p:sp>
@@ -3746,7 +3746,7 @@
                 <a:spcPct val="0"/>
               </a:spcBef>
             </a:pPr>
-            <a:endParaRPr lang="en-US" smtClean="0"/>
+            <a:endParaRPr lang="en-US" dirty="0" smtClean="0"/>
           </a:p>
         </p:txBody>
       </p:sp>
@@ -3893,7 +3893,7 @@
               <a:pPr eaLnBrk="1" hangingPunct="1"/>
               <a:t>1</a:t>
             </a:fld>
-            <a:endParaRPr lang="en-US" sz="1200" smtClean="0"/>
+            <a:endParaRPr lang="en-US" sz="1200" dirty="0" smtClean="0"/>
           </a:p>
         </p:txBody>
       </p:sp>
@@ -4025,7 +4025,7 @@
             <a:pPr>
               <a:defRPr/>
             </a:pPr>
-            <a:endParaRPr lang="en-US"/>
+            <a:endParaRPr lang="en-US" dirty="0"/>
           </a:p>
         </p:txBody>
       </p:sp>
@@ -4061,7 +4061,7 @@
             <a:pPr>
               <a:defRPr/>
             </a:pPr>
-            <a:endParaRPr lang="en-US"/>
+            <a:endParaRPr lang="en-US" dirty="0"/>
           </a:p>
         </p:txBody>
       </p:sp>
@@ -4104,7 +4104,7 @@
               </a:pPr>
               <a:t>‹#›</a:t>
             </a:fld>
-            <a:endParaRPr lang="en-US"/>
+            <a:endParaRPr lang="en-US" dirty="0"/>
           </a:p>
         </p:txBody>
       </p:sp>
@@ -4237,7 +4237,7 @@
             <a:pPr>
               <a:defRPr/>
             </a:pPr>
-            <a:endParaRPr lang="en-US"/>
+            <a:endParaRPr lang="en-US" dirty="0"/>
           </a:p>
         </p:txBody>
       </p:sp>
@@ -4265,7 +4265,7 @@
             <a:pPr>
               <a:defRPr/>
             </a:pPr>
-            <a:endParaRPr lang="en-US"/>
+            <a:endParaRPr lang="en-US" dirty="0"/>
           </a:p>
         </p:txBody>
       </p:sp>
@@ -4300,7 +4300,7 @@
               </a:pPr>
               <a:t>‹#›</a:t>
             </a:fld>
-            <a:endParaRPr lang="en-US"/>
+            <a:endParaRPr lang="en-US" dirty="0"/>
           </a:p>
         </p:txBody>
       </p:sp>
@@ -4443,7 +4443,7 @@
             <a:pPr>
               <a:defRPr/>
             </a:pPr>
-            <a:endParaRPr lang="en-US"/>
+            <a:endParaRPr lang="en-US" dirty="0"/>
           </a:p>
         </p:txBody>
       </p:sp>
@@ -4471,7 +4471,7 @@
             <a:pPr>
               <a:defRPr/>
             </a:pPr>
-            <a:endParaRPr lang="en-US"/>
+            <a:endParaRPr lang="en-US" dirty="0"/>
           </a:p>
         </p:txBody>
       </p:sp>
@@ -4506,7 +4506,7 @@
               </a:pPr>
               <a:t>‹#›</a:t>
             </a:fld>
-            <a:endParaRPr lang="en-US"/>
+            <a:endParaRPr lang="en-US" dirty="0"/>
           </a:p>
         </p:txBody>
       </p:sp>
@@ -4639,7 +4639,7 @@
             <a:pPr>
               <a:defRPr/>
             </a:pPr>
-            <a:endParaRPr lang="en-US"/>
+            <a:endParaRPr lang="en-US" dirty="0"/>
           </a:p>
         </p:txBody>
       </p:sp>
@@ -4667,7 +4667,7 @@
             <a:pPr>
               <a:defRPr/>
             </a:pPr>
-            <a:endParaRPr lang="en-US"/>
+            <a:endParaRPr lang="en-US" dirty="0"/>
           </a:p>
         </p:txBody>
       </p:sp>
@@ -4702,7 +4702,7 @@
               </a:pPr>
               <a:t>‹#›</a:t>
             </a:fld>
-            <a:endParaRPr lang="en-US"/>
+            <a:endParaRPr lang="en-US" dirty="0"/>
           </a:p>
         </p:txBody>
       </p:sp>
@@ -4857,7 +4857,7 @@
             <a:pPr>
               <a:defRPr/>
             </a:pPr>
-            <a:endParaRPr lang="en-US"/>
+            <a:endParaRPr lang="en-US" dirty="0"/>
           </a:p>
         </p:txBody>
       </p:sp>
@@ -4885,7 +4885,7 @@
             <a:pPr>
               <a:defRPr/>
             </a:pPr>
-            <a:endParaRPr lang="en-US"/>
+            <a:endParaRPr lang="en-US" dirty="0"/>
           </a:p>
         </p:txBody>
       </p:sp>
@@ -4920,7 +4920,7 @@
               </a:pPr>
               <a:t>‹#›</a:t>
             </a:fld>
-            <a:endParaRPr lang="en-US"/>
+            <a:endParaRPr lang="en-US" dirty="0"/>
           </a:p>
         </p:txBody>
       </p:sp>
@@ -5171,7 +5171,7 @@
             <a:pPr>
               <a:defRPr/>
             </a:pPr>
-            <a:endParaRPr lang="en-US"/>
+            <a:endParaRPr lang="en-US" dirty="0"/>
           </a:p>
         </p:txBody>
       </p:sp>
@@ -5199,7 +5199,7 @@
             <a:pPr>
               <a:defRPr/>
             </a:pPr>
-            <a:endParaRPr lang="en-US"/>
+            <a:endParaRPr lang="en-US" dirty="0"/>
           </a:p>
         </p:txBody>
       </p:sp>
@@ -5234,7 +5234,7 @@
               </a:pPr>
               <a:t>‹#›</a:t>
             </a:fld>
-            <a:endParaRPr lang="en-US"/>
+            <a:endParaRPr lang="en-US" dirty="0"/>
           </a:p>
         </p:txBody>
       </p:sp>
@@ -5624,7 +5624,7 @@
             <a:pPr>
               <a:defRPr/>
             </a:pPr>
-            <a:endParaRPr lang="en-US"/>
+            <a:endParaRPr lang="en-US" dirty="0"/>
           </a:p>
         </p:txBody>
       </p:sp>
@@ -5652,7 +5652,7 @@
             <a:pPr>
               <a:defRPr/>
             </a:pPr>
-            <a:endParaRPr lang="en-US"/>
+            <a:endParaRPr lang="en-US" dirty="0"/>
           </a:p>
         </p:txBody>
       </p:sp>
@@ -5687,7 +5687,7 @@
               </a:pPr>
               <a:t>‹#›</a:t>
             </a:fld>
-            <a:endParaRPr lang="en-US"/>
+            <a:endParaRPr lang="en-US" dirty="0"/>
           </a:p>
         </p:txBody>
       </p:sp>
@@ -5768,7 +5768,7 @@
             <a:pPr>
               <a:defRPr/>
             </a:pPr>
-            <a:endParaRPr lang="en-US"/>
+            <a:endParaRPr lang="en-US" dirty="0"/>
           </a:p>
         </p:txBody>
       </p:sp>
@@ -5796,7 +5796,7 @@
             <a:pPr>
               <a:defRPr/>
             </a:pPr>
-            <a:endParaRPr lang="en-US"/>
+            <a:endParaRPr lang="en-US" dirty="0"/>
           </a:p>
         </p:txBody>
       </p:sp>
@@ -5831,7 +5831,7 @@
               </a:pPr>
               <a:t>‹#›</a:t>
             </a:fld>
-            <a:endParaRPr lang="en-US"/>
+            <a:endParaRPr lang="en-US" dirty="0"/>
           </a:p>
         </p:txBody>
       </p:sp>
@@ -5889,7 +5889,7 @@
             <a:pPr>
               <a:defRPr/>
             </a:pPr>
-            <a:endParaRPr lang="en-US"/>
+            <a:endParaRPr lang="en-US" dirty="0"/>
           </a:p>
         </p:txBody>
       </p:sp>
@@ -5917,7 +5917,7 @@
             <a:pPr>
               <a:defRPr/>
             </a:pPr>
-            <a:endParaRPr lang="en-US"/>
+            <a:endParaRPr lang="en-US" dirty="0"/>
           </a:p>
         </p:txBody>
       </p:sp>
@@ -5952,7 +5952,7 @@
               </a:pPr>
               <a:t>‹#›</a:t>
             </a:fld>
-            <a:endParaRPr lang="en-US"/>
+            <a:endParaRPr lang="en-US" dirty="0"/>
           </a:p>
         </p:txBody>
       </p:sp>
@@ -6192,7 +6192,7 @@
             <a:pPr>
               <a:defRPr/>
             </a:pPr>
-            <a:endParaRPr lang="en-US"/>
+            <a:endParaRPr lang="en-US" dirty="0"/>
           </a:p>
         </p:txBody>
       </p:sp>
@@ -6220,7 +6220,7 @@
             <a:pPr>
               <a:defRPr/>
             </a:pPr>
-            <a:endParaRPr lang="en-US"/>
+            <a:endParaRPr lang="en-US" dirty="0"/>
           </a:p>
         </p:txBody>
       </p:sp>
@@ -6255,7 +6255,7 @@
               </a:pPr>
               <a:t>‹#›</a:t>
             </a:fld>
-            <a:endParaRPr lang="en-US"/>
+            <a:endParaRPr lang="en-US" dirty="0"/>
           </a:p>
         </p:txBody>
       </p:sp>
@@ -6380,10 +6380,9 @@
           <a:p>
             <a:pPr lvl="0"/>
             <a:r>
-              <a:rPr lang="en-US" noProof="0" smtClean="0"/>
+              <a:rPr lang="en-US" noProof="0" dirty="0" smtClean="0"/>
               <a:t>Click icon to add picture</a:t>
             </a:r>
-            <a:endParaRPr lang="en-US" noProof="0" dirty="0" smtClean="0"/>
           </a:p>
         </p:txBody>
       </p:sp>
@@ -6476,7 +6475,7 @@
             <a:pPr>
               <a:defRPr/>
             </a:pPr>
-            <a:endParaRPr lang="en-US"/>
+            <a:endParaRPr lang="en-US" dirty="0"/>
           </a:p>
         </p:txBody>
       </p:sp>
@@ -6504,7 +6503,7 @@
             <a:pPr>
               <a:defRPr/>
             </a:pPr>
-            <a:endParaRPr lang="en-US"/>
+            <a:endParaRPr lang="en-US" dirty="0"/>
           </a:p>
         </p:txBody>
       </p:sp>
@@ -6539,7 +6538,7 @@
               </a:pPr>
               <a:t>‹#›</a:t>
             </a:fld>
-            <a:endParaRPr lang="en-US"/>
+            <a:endParaRPr lang="en-US" dirty="0"/>
           </a:p>
         </p:txBody>
       </p:sp>
@@ -6739,7 +6738,7 @@
             <a:pPr>
               <a:defRPr/>
             </a:pPr>
-            <a:endParaRPr lang="en-US"/>
+            <a:endParaRPr lang="en-US" dirty="0"/>
           </a:p>
         </p:txBody>
       </p:sp>
@@ -6789,7 +6788,7 @@
             <a:pPr>
               <a:defRPr/>
             </a:pPr>
-            <a:endParaRPr lang="en-US"/>
+            <a:endParaRPr lang="en-US" dirty="0"/>
           </a:p>
         </p:txBody>
       </p:sp>
@@ -6846,7 +6845,7 @@
               </a:pPr>
               <a:t>‹#›</a:t>
             </a:fld>
-            <a:endParaRPr lang="en-US"/>
+            <a:endParaRPr lang="en-US" dirty="0"/>
           </a:p>
         </p:txBody>
       </p:sp>
@@ -7586,79 +7585,7 @@
                 <a:ea typeface="+mj-ea"/>
                 <a:cs typeface="+mj-cs"/>
               </a:rPr>
-              <a:t>Travis </a:t>
-            </a:r>
-            <a:r>
-              <a:rPr kumimoji="1" lang="en-US" sz="6000" dirty="0" err="1" smtClean="0">
-                <a:solidFill>
-                  <a:schemeClr val="bg1"/>
-                </a:solidFill>
-                <a:effectLst>
-                  <a:outerShdw blurRad="101600" dist="38100" dir="2700000" algn="tl">
-                    <a:srgbClr val="000000">
-                      <a:alpha val="43137"/>
-                    </a:srgbClr>
-                  </a:outerShdw>
-                </a:effectLst>
-                <a:latin typeface="+mj-lt"/>
-                <a:ea typeface="+mj-ea"/>
-                <a:cs typeface="+mj-cs"/>
-              </a:rPr>
-              <a:t>Crumley</a:t>
-            </a:r>
-            <a:r>
-              <a:rPr kumimoji="1" lang="en-US" sz="6000" dirty="0" smtClean="0">
-                <a:solidFill>
-                  <a:schemeClr val="bg1"/>
-                </a:solidFill>
-                <a:effectLst>
-                  <a:outerShdw blurRad="101600" dist="38100" dir="2700000" algn="tl">
-                    <a:srgbClr val="000000">
-                      <a:alpha val="43137"/>
-                    </a:srgbClr>
-                  </a:outerShdw>
-                </a:effectLst>
-                <a:latin typeface="+mj-lt"/>
-                <a:ea typeface="+mj-ea"/>
-                <a:cs typeface="+mj-cs"/>
-              </a:rPr>
-              <a:t>, David </a:t>
-            </a:r>
-            <a:r>
-              <a:rPr kumimoji="1" lang="en-US" sz="6000" dirty="0" err="1" smtClean="0">
-                <a:solidFill>
-                  <a:schemeClr val="bg1"/>
-                </a:solidFill>
-                <a:effectLst>
-                  <a:outerShdw blurRad="101600" dist="38100" dir="2700000" algn="tl">
-                    <a:srgbClr val="000000">
-                      <a:alpha val="43137"/>
-                    </a:srgbClr>
-                  </a:outerShdw>
-                </a:effectLst>
-                <a:latin typeface="+mj-lt"/>
-                <a:ea typeface="+mj-ea"/>
-                <a:cs typeface="+mj-cs"/>
-              </a:rPr>
-              <a:t>Egolf</a:t>
-            </a:r>
-            <a:r>
-              <a:rPr kumimoji="1" lang="en-US" sz="6000" dirty="0" smtClean="0">
-                <a:solidFill>
-                  <a:schemeClr val="bg1"/>
-                </a:solidFill>
-                <a:effectLst>
-                  <a:outerShdw blurRad="101600" dist="38100" dir="2700000" algn="tl">
-                    <a:srgbClr val="000000">
-                      <a:alpha val="43137"/>
-                    </a:srgbClr>
-                  </a:outerShdw>
-                </a:effectLst>
-                <a:latin typeface="+mj-lt"/>
-                <a:ea typeface="+mj-ea"/>
-                <a:cs typeface="+mj-cs"/>
-              </a:rPr>
-              <a:t>, and Garrett Wilson</a:t>
+              <a:t>Travis Crumley, David Egolf, and Garrett Wilson</a:t>
             </a:r>
             <a:endParaRPr kumimoji="1" lang="en-US" sz="6000" dirty="0">
               <a:solidFill>
@@ -7901,7 +7828,7 @@
                 <a:spcPct val="50000"/>
               </a:spcBef>
             </a:pPr>
-            <a:endParaRPr lang="en-US">
+            <a:endParaRPr lang="en-US" dirty="0">
               <a:latin typeface="Times New Roman" pitchFamily="18" charset="0"/>
             </a:endParaRPr>
           </a:p>
@@ -7965,7 +7892,7 @@
               <a:pPr algn="ctr" defTabSz="4389438">
                 <a:defRPr/>
               </a:pPr>
-              <a:endParaRPr lang="en-US">
+              <a:endParaRPr lang="en-US" dirty="0">
                 <a:effectLst>
                   <a:outerShdw blurRad="38100" dist="38100" dir="2700000" algn="tl">
                     <a:srgbClr val="C0C0C0"/>
@@ -8076,17 +8003,6 @@
                 <a:defRPr/>
               </a:pPr>
               <a:r>
-                <a:rPr kumimoji="1" lang="en-US" sz="2000" i="1" dirty="0" err="1">
-                  <a:solidFill>
-                    <a:schemeClr val="bg1"/>
-                  </a:solidFill>
-                  <a:latin typeface="+mj-lt"/>
-                  <a:ea typeface="+mj-ea"/>
-                  <a:cs typeface="+mj-cs"/>
-                </a:rPr>
-                <a:t>Korb</a:t>
-              </a:r>
-              <a:r>
                 <a:rPr kumimoji="1" lang="en-US" sz="2000" i="1" dirty="0">
                   <a:solidFill>
                     <a:schemeClr val="bg1"/>
@@ -8095,7 +8011,7 @@
                   <a:ea typeface="+mj-ea"/>
                   <a:cs typeface="+mj-cs"/>
                 </a:rPr>
-                <a:t>, Kevin B., and Ann E. Nicholson. Bayesian Artificial Intelligence. Boca Raton, FL: CRC, 2010. Print.</a:t>
+                <a:t>Korb, Kevin B., and Ann E. Nicholson. Bayesian Artificial Intelligence. Boca Raton, FL: CRC, 2010. Print.</a:t>
               </a:r>
             </a:p>
             <a:p>
@@ -8106,17 +8022,6 @@
                 <a:defRPr/>
               </a:pPr>
               <a:r>
-                <a:rPr kumimoji="1" lang="en-US" sz="2000" i="1" dirty="0" err="1">
-                  <a:solidFill>
-                    <a:schemeClr val="bg1"/>
-                  </a:solidFill>
-                  <a:latin typeface="+mj-lt"/>
-                  <a:ea typeface="+mj-ea"/>
-                  <a:cs typeface="+mj-cs"/>
-                </a:rPr>
-                <a:t>Lawrance</a:t>
-              </a:r>
-              <a:r>
                 <a:rPr kumimoji="1" lang="en-US" sz="2000" i="1" dirty="0">
                   <a:solidFill>
                     <a:schemeClr val="bg1"/>
@@ -8125,7 +8030,7 @@
                   <a:ea typeface="+mj-ea"/>
                   <a:cs typeface="+mj-cs"/>
                 </a:rPr>
-                <a:t>, Nicholas RJ. Autonomous soaring flight for unmanned aerial vehicles. Diss. University of Sydney, 2011.</a:t>
+                <a:t>Lawrance, Nicholas RJ. Autonomous soaring flight for unmanned aerial vehicles. Diss. University of Sydney, 2011.</a:t>
               </a:r>
             </a:p>
           </p:txBody>
@@ -8279,7 +8184,7 @@
                 <a:spcPct val="50000"/>
               </a:spcBef>
             </a:pPr>
-            <a:endParaRPr lang="en-US" sz="2900">
+            <a:endParaRPr lang="en-US" sz="2900" dirty="0">
               <a:latin typeface="Times New Roman" pitchFamily="18" charset="0"/>
             </a:endParaRPr>
           </a:p>
@@ -8347,7 +8252,7 @@
             </a:bodyPr>
             <a:lstStyle/>
             <a:p>
-              <a:endParaRPr lang="en-US"/>
+              <a:endParaRPr lang="en-US" dirty="0"/>
             </a:p>
           </p:txBody>
         </p:sp>
@@ -8398,7 +8303,7 @@
             <a:lstStyle/>
             <a:p>
               <a:pPr algn="ctr"/>
-              <a:endParaRPr lang="en-US">
+              <a:endParaRPr lang="en-US" dirty="0">
                 <a:latin typeface="Times New Roman" pitchFamily="18" charset="0"/>
               </a:endParaRPr>
             </a:p>
@@ -8553,7 +8458,7 @@
                 <a:spcPct val="50000"/>
               </a:spcBef>
             </a:pPr>
-            <a:endParaRPr lang="en-US">
+            <a:endParaRPr lang="en-US" dirty="0">
               <a:latin typeface="Times New Roman" pitchFamily="18" charset="0"/>
             </a:endParaRPr>
           </a:p>
@@ -8707,7 +8612,7 @@
                 <a:spcPct val="50000"/>
               </a:spcBef>
             </a:pPr>
-            <a:endParaRPr lang="en-US">
+            <a:endParaRPr lang="en-US" dirty="0">
               <a:latin typeface="Times New Roman" pitchFamily="18" charset="0"/>
             </a:endParaRPr>
           </a:p>
@@ -8861,7 +8766,7 @@
                 <a:spcPct val="50000"/>
               </a:spcBef>
             </a:pPr>
-            <a:endParaRPr lang="en-US">
+            <a:endParaRPr lang="en-US" dirty="0">
               <a:latin typeface="Times New Roman" pitchFamily="18" charset="0"/>
             </a:endParaRPr>
           </a:p>
@@ -9011,7 +8916,7 @@
           </a:lstStyle>
           <a:p>
             <a:pPr eaLnBrk="1" hangingPunct="1"/>
-            <a:endParaRPr lang="en-US">
+            <a:endParaRPr lang="en-US" dirty="0">
               <a:latin typeface="Times New Roman" pitchFamily="18" charset="0"/>
             </a:endParaRPr>
           </a:p>
@@ -9166,7 +9071,7 @@
               </a:spcBef>
             </a:pPr>
             <a:r>
-              <a:rPr lang="en-US" sz="3200">
+              <a:rPr lang="en-US" sz="3200" dirty="0">
                 <a:solidFill>
                   <a:schemeClr val="bg1"/>
                 </a:solidFill>
@@ -9326,7 +9231,7 @@
               </a:spcBef>
             </a:pPr>
             <a:r>
-              <a:rPr lang="en-US" sz="3200">
+              <a:rPr lang="en-US" sz="3200" dirty="0">
                 <a:solidFill>
                   <a:schemeClr val="bg1"/>
                 </a:solidFill>
@@ -9400,7 +9305,7 @@
               <a:pPr>
                 <a:defRPr/>
               </a:pPr>
-              <a:endParaRPr lang="en-US"/>
+              <a:endParaRPr lang="en-US" dirty="0"/>
             </a:p>
           </p:txBody>
         </p:sp>
@@ -9414,8 +9319,8 @@
           </p:nvSpPr>
           <p:spPr bwMode="auto">
             <a:xfrm>
-              <a:off x="1143000" y="25146000"/>
-              <a:ext cx="13030200" cy="3618181"/>
+              <a:off x="1142999" y="25146000"/>
+              <a:ext cx="13106399" cy="3186159"/>
             </a:xfrm>
             <a:prstGeom prst="rect">
               <a:avLst/>
@@ -9429,7 +9334,7 @@
             </a:ln>
           </p:spPr>
           <p:txBody>
-            <a:bodyPr>
+            <a:bodyPr wrap="square">
               <a:spAutoFit/>
             </a:bodyPr>
             <a:lstStyle/>
@@ -9487,7 +9392,18 @@
                   <a:ea typeface="+mj-ea"/>
                   <a:cs typeface="+mj-cs"/>
                 </a:rPr>
-                <a:t>Our </a:t>
+                <a:t>Our goal was to increase glider flight time by writing software for autonomously finding and using thermal updrafts. We split our work into three parts: basic implementation </a:t>
+              </a:r>
+              <a:r>
+                <a:rPr kumimoji="1" lang="en-US" sz="3200" dirty="0">
+                  <a:solidFill>
+                    <a:schemeClr val="bg1"/>
+                  </a:solidFill>
+                  <a:latin typeface="+mj-lt"/>
+                  <a:ea typeface="+mj-ea"/>
+                  <a:cs typeface="+mj-cs"/>
+                </a:rPr>
+                <a:t>of </a:t>
               </a:r>
               <a:r>
                 <a:rPr kumimoji="1" lang="en-US" sz="3200" dirty="0" smtClean="0">
@@ -9498,18 +9414,7 @@
                   <a:ea typeface="+mj-ea"/>
                   <a:cs typeface="+mj-cs"/>
                 </a:rPr>
-                <a:t>project was </a:t>
-              </a:r>
-              <a:r>
-                <a:rPr kumimoji="1" lang="en-US" sz="3200" dirty="0" smtClean="0">
-                  <a:solidFill>
-                    <a:schemeClr val="bg1"/>
-                  </a:solidFill>
-                  <a:latin typeface="+mj-lt"/>
-                  <a:ea typeface="+mj-ea"/>
-                  <a:cs typeface="+mj-cs"/>
-                </a:rPr>
-                <a:t>to create </a:t>
+                <a:t>an existing algorithm, exploration </a:t>
               </a:r>
               <a:r>
                 <a:rPr kumimoji="1" lang="en-US" sz="3200" dirty="0">
@@ -9520,62 +9425,7 @@
                   <a:ea typeface="+mj-ea"/>
                   <a:cs typeface="+mj-cs"/>
                 </a:rPr>
-                <a:t>and implement the software necessary for a glider to autonomously find and use the updrafts from thermals to sustain longer flight </a:t>
-              </a:r>
-              <a:r>
-                <a:rPr kumimoji="1" lang="en-US" sz="3200" dirty="0" smtClean="0">
-                  <a:solidFill>
-                    <a:schemeClr val="bg1"/>
-                  </a:solidFill>
-                  <a:latin typeface="+mj-lt"/>
-                  <a:ea typeface="+mj-ea"/>
-                  <a:cs typeface="+mj-cs"/>
-                </a:rPr>
-                <a:t>times. The project </a:t>
-              </a:r>
-              <a:r>
-                <a:rPr kumimoji="1" lang="en-US" sz="3200" dirty="0" smtClean="0">
-                  <a:solidFill>
-                    <a:schemeClr val="bg1"/>
-                  </a:solidFill>
-                  <a:latin typeface="+mj-lt"/>
-                  <a:ea typeface="+mj-ea"/>
-                  <a:cs typeface="+mj-cs"/>
-                </a:rPr>
-                <a:t>was </a:t>
-              </a:r>
-              <a:r>
-                <a:rPr kumimoji="1" lang="en-US" sz="3200" dirty="0">
-                  <a:solidFill>
-                    <a:schemeClr val="bg1"/>
-                  </a:solidFill>
-                  <a:latin typeface="+mj-lt"/>
-                  <a:ea typeface="+mj-ea"/>
-                  <a:cs typeface="+mj-cs"/>
-                </a:rPr>
-                <a:t>divided into three </a:t>
-              </a:r>
-              <a:r>
-                <a:rPr kumimoji="1" lang="en-US" sz="3200" dirty="0" smtClean="0">
-                  <a:solidFill>
-                    <a:schemeClr val="bg1"/>
-                  </a:solidFill>
-                  <a:latin typeface="+mj-lt"/>
-                  <a:ea typeface="+mj-ea"/>
-                  <a:cs typeface="+mj-cs"/>
-                </a:rPr>
-                <a:t>parts: a </a:t>
-              </a:r>
-              <a:r>
-                <a:rPr kumimoji="1" lang="en-US" sz="3200" dirty="0">
-                  <a:solidFill>
-                    <a:schemeClr val="bg1"/>
-                  </a:solidFill>
-                  <a:latin typeface="+mj-lt"/>
-                  <a:ea typeface="+mj-ea"/>
-                  <a:cs typeface="+mj-cs"/>
-                </a:rPr>
-                <a:t>basic implementation of existing algorithms, an exploration of thermal identification </a:t>
+                <a:t>of thermal identification </a:t>
               </a:r>
               <a:r>
                 <a:rPr kumimoji="1" lang="en-US" sz="3200" dirty="0" smtClean="0">
@@ -9597,7 +9447,7 @@
                   <a:ea typeface="+mj-ea"/>
                   <a:cs typeface="+mj-cs"/>
                 </a:rPr>
-                <a:t>and an exploration of machine learning to provide better soaring decisions</a:t>
+                <a:t>and </a:t>
               </a:r>
               <a:r>
                 <a:rPr kumimoji="1" lang="en-US" sz="3200" dirty="0" smtClean="0">
@@ -9608,7 +9458,29 @@
                   <a:ea typeface="+mj-ea"/>
                   <a:cs typeface="+mj-cs"/>
                 </a:rPr>
-                <a:t>.</a:t>
+                <a:t>exploration </a:t>
+              </a:r>
+              <a:r>
+                <a:rPr kumimoji="1" lang="en-US" sz="3200" dirty="0">
+                  <a:solidFill>
+                    <a:schemeClr val="bg1"/>
+                  </a:solidFill>
+                  <a:latin typeface="+mj-lt"/>
+                  <a:ea typeface="+mj-ea"/>
+                  <a:cs typeface="+mj-cs"/>
+                </a:rPr>
+                <a:t>of machine learning </a:t>
+              </a:r>
+              <a:r>
+                <a:rPr kumimoji="1" lang="en-US" sz="3200" dirty="0" smtClean="0">
+                  <a:solidFill>
+                    <a:schemeClr val="bg1"/>
+                  </a:solidFill>
+                  <a:latin typeface="+mj-lt"/>
+                  <a:ea typeface="+mj-ea"/>
+                  <a:cs typeface="+mj-cs"/>
+                </a:rPr>
+                <a:t>methods for more flexible decision making.</a:t>
               </a:r>
               <a:endParaRPr kumimoji="1" lang="en-US" sz="3200" dirty="0">
                 <a:solidFill>
@@ -9945,7 +9817,7 @@
                 <a:spcPct val="50000"/>
               </a:spcBef>
             </a:pPr>
-            <a:endParaRPr lang="en-US" sz="3200"/>
+            <a:endParaRPr lang="en-US" sz="3200" dirty="0"/>
           </a:p>
         </p:txBody>
       </p:sp>
@@ -10005,7 +9877,29 @@
                 <a:ea typeface="+mj-ea"/>
                 <a:cs typeface="+mj-cs"/>
               </a:rPr>
-              <a:t>3:  Gaussian process regression (left) run live on data collected from a glider flying in the simulator (right)</a:t>
+              <a:t>3:  Gaussian process regression (left) </a:t>
+            </a:r>
+            <a:r>
+              <a:rPr kumimoji="1" lang="en-US" sz="2000" dirty="0" smtClean="0">
+                <a:solidFill>
+                  <a:schemeClr val="bg1"/>
+                </a:solidFill>
+                <a:latin typeface="+mj-lt"/>
+                <a:ea typeface="+mj-ea"/>
+                <a:cs typeface="+mj-cs"/>
+              </a:rPr>
+              <a:t>runs </a:t>
+            </a:r>
+            <a:r>
+              <a:rPr kumimoji="1" lang="en-US" sz="2000" dirty="0" smtClean="0">
+                <a:solidFill>
+                  <a:schemeClr val="bg1"/>
+                </a:solidFill>
+                <a:latin typeface="+mj-lt"/>
+                <a:ea typeface="+mj-ea"/>
+                <a:cs typeface="+mj-cs"/>
+              </a:rPr>
+              <a:t>live on data collected from a glider flying in the simulator (right)</a:t>
             </a:r>
             <a:endParaRPr kumimoji="1" lang="en-US" sz="2000" dirty="0">
               <a:solidFill>
@@ -10076,7 +9970,7 @@
               <a:pPr algn="ctr" defTabSz="4389438">
                 <a:defRPr/>
               </a:pPr>
-              <a:endParaRPr lang="en-US">
+              <a:endParaRPr lang="en-US" dirty="0">
                 <a:effectLst>
                   <a:outerShdw blurRad="38100" dist="38100" dir="2700000" algn="tl">
                     <a:srgbClr val="C0C0C0"/>
@@ -10153,18 +10047,7 @@
                   <a:ea typeface="+mj-ea"/>
                   <a:cs typeface="+mj-cs"/>
                 </a:rPr>
-                <a:t>Successfully </a:t>
-              </a:r>
-              <a:r>
-                <a:rPr kumimoji="1" lang="en-US" sz="3200" dirty="0" smtClean="0">
-                  <a:solidFill>
-                    <a:schemeClr val="bg1"/>
-                  </a:solidFill>
-                  <a:latin typeface="+mj-lt"/>
-                  <a:ea typeface="+mj-ea"/>
-                  <a:cs typeface="+mj-cs"/>
-                </a:rPr>
-                <a:t>implemented </a:t>
+                <a:t>Implemented </a:t>
               </a:r>
               <a:r>
                 <a:rPr kumimoji="1" lang="en-US" sz="3200" dirty="0" smtClean="0">
@@ -10177,14 +10060,6 @@
                 </a:rPr>
                 <a:t>a basic soaring algorithm using existing research from Daniel Edwards and Michael Allen.</a:t>
               </a:r>
-              <a:endParaRPr kumimoji="1" lang="en-US" sz="3200" dirty="0" smtClean="0">
-                <a:solidFill>
-                  <a:schemeClr val="bg1"/>
-                </a:solidFill>
-                <a:latin typeface="+mj-lt"/>
-                <a:ea typeface="+mj-ea"/>
-                <a:cs typeface="+mj-cs"/>
-              </a:endParaRPr>
             </a:p>
             <a:p>
               <a:pPr marL="457200" indent="-457200" algn="just" defTabSz="4389438">
@@ -10195,6 +10070,14 @@
                 <a:buChar char="•"/>
                 <a:defRPr/>
               </a:pPr>
+              <a:r>
+                <a:rPr kumimoji="1" lang="en-US" sz="3200" dirty="0" smtClean="0">
+                  <a:solidFill>
+                    <a:schemeClr val="bg1"/>
+                  </a:solidFill>
+                </a:rPr>
+                <a:t>Used </a:t>
+              </a:r>
               <a:r>
                 <a:rPr kumimoji="1" lang="en-US" sz="3200" dirty="0" smtClean="0">
                   <a:solidFill>
@@ -10215,7 +10098,7 @@
                   <a:ea typeface="+mj-ea"/>
                   <a:cs typeface="+mj-cs"/>
                 </a:rPr>
-                <a:t>process regression was successfully </a:t>
+                <a:t>process regression </a:t>
               </a:r>
               <a:r>
                 <a:rPr kumimoji="1" lang="en-US" sz="3200" dirty="0" smtClean="0">
@@ -10226,7 +10109,7 @@
                   <a:ea typeface="+mj-ea"/>
                   <a:cs typeface="+mj-cs"/>
                 </a:rPr>
-                <a:t>used </a:t>
+                <a:t>to </a:t>
               </a:r>
               <a:r>
                 <a:rPr kumimoji="1" lang="en-US" sz="3200" dirty="0" smtClean="0">
@@ -10237,7 +10120,15 @@
                   <a:ea typeface="+mj-ea"/>
                   <a:cs typeface="+mj-cs"/>
                 </a:rPr>
-                <a:t>to identify </a:t>
+                <a:t>identify complex thermals and circle them in the </a:t>
+              </a:r>
+              <a:r>
+                <a:rPr kumimoji="1" lang="en-CA" sz="3200" dirty="0">
+                  <a:solidFill>
+                    <a:schemeClr val="bg1"/>
+                  </a:solidFill>
+                </a:rPr>
+                <a:t>CRRCSim </a:t>
               </a:r>
               <a:r>
                 <a:rPr kumimoji="1" lang="en-US" sz="3200" dirty="0" smtClean="0">
@@ -10248,7 +10139,7 @@
                   <a:ea typeface="+mj-ea"/>
                   <a:cs typeface="+mj-cs"/>
                 </a:rPr>
-                <a:t>complex thermals </a:t>
+                <a:t>simulator</a:t>
               </a:r>
               <a:r>
                 <a:rPr kumimoji="1" lang="en-US" sz="3200" dirty="0" smtClean="0">
@@ -10259,7 +10150,7 @@
                   <a:ea typeface="+mj-ea"/>
                   <a:cs typeface="+mj-cs"/>
                 </a:rPr>
-                <a:t>and circle them in the CRRCSIM simulator.</a:t>
+                <a:t>.</a:t>
               </a:r>
             </a:p>
             <a:p>
@@ -10280,7 +10171,7 @@
                   <a:ea typeface="+mj-ea"/>
                   <a:cs typeface="+mj-cs"/>
                 </a:rPr>
-                <a:t>Dynamic </a:t>
+                <a:t>Used dynamic </a:t>
               </a:r>
               <a:r>
                 <a:rPr kumimoji="1" lang="en-US" sz="3200" dirty="0" smtClean="0">
@@ -10291,7 +10182,29 @@
                   <a:ea typeface="+mj-ea"/>
                   <a:cs typeface="+mj-cs"/>
                 </a:rPr>
-                <a:t>programming with neural interpolation was successfully used to develop an adaptive policy in a simplified environment.</a:t>
+                <a:t>programming with neural interpolation </a:t>
+              </a:r>
+              <a:r>
+                <a:rPr kumimoji="1" lang="en-US" sz="3200" dirty="0" smtClean="0">
+                  <a:solidFill>
+                    <a:schemeClr val="bg1"/>
+                  </a:solidFill>
+                  <a:latin typeface="+mj-lt"/>
+                  <a:ea typeface="+mj-ea"/>
+                  <a:cs typeface="+mj-cs"/>
+                </a:rPr>
+                <a:t>to </a:t>
+              </a:r>
+              <a:r>
+                <a:rPr kumimoji="1" lang="en-US" sz="3200" dirty="0" smtClean="0">
+                  <a:solidFill>
+                    <a:schemeClr val="bg1"/>
+                  </a:solidFill>
+                  <a:latin typeface="+mj-lt"/>
+                  <a:ea typeface="+mj-ea"/>
+                  <a:cs typeface="+mj-cs"/>
+                </a:rPr>
+                <a:t>develop an adaptive policy in a simplified environment.</a:t>
               </a:r>
               <a:br>
                 <a:rPr kumimoji="1" lang="en-US" sz="3200" dirty="0" smtClean="0">
@@ -10364,8 +10277,8 @@
         </p:nvSpPr>
         <p:spPr bwMode="auto">
           <a:xfrm>
-            <a:off x="15240000" y="22774893"/>
-            <a:ext cx="13182600" cy="4524315"/>
+            <a:off x="15106650" y="22774893"/>
+            <a:ext cx="13506450" cy="4524315"/>
           </a:xfrm>
           <a:prstGeom prst="rect">
             <a:avLst/>
@@ -10552,8 +10465,8 @@
             </p:nvSpPr>
             <p:spPr bwMode="auto">
               <a:xfrm>
-                <a:off x="29641800" y="6400800"/>
-                <a:ext cx="13182600" cy="2486516"/>
+                <a:off x="29565600" y="6400800"/>
+                <a:ext cx="13258800" cy="2486516"/>
               </a:xfrm>
               <a:prstGeom prst="rect">
                 <a:avLst/>
@@ -10567,7 +10480,7 @@
               </a:ln>
             </p:spPr>
             <p:txBody>
-              <a:bodyPr>
+              <a:bodyPr wrap="square">
                 <a:spAutoFit/>
               </a:bodyPr>
               <a:lstStyle/>
@@ -10584,16 +10497,19 @@
                     <a:ea typeface="+mj-ea"/>
                     <a:cs typeface="+mj-cs"/>
                   </a:rPr>
-                  <a:t>IMPROVEMENT: POLICY DEVELOPMENT</a:t>
+                  <a:t>IMPROVEMENT: </a:t>
                 </a:r>
-                <a:endParaRPr kumimoji="1" lang="en-US" sz="3800" u="sng" dirty="0">
-                  <a:solidFill>
-                    <a:schemeClr val="bg1"/>
-                  </a:solidFill>
-                  <a:latin typeface="+mj-lt"/>
-                  <a:ea typeface="+mj-ea"/>
-                  <a:cs typeface="+mj-cs"/>
-                </a:endParaRPr>
+                <a:r>
+                  <a:rPr kumimoji="1" lang="en-US" sz="3800" u="sng" dirty="0" smtClean="0">
+                    <a:solidFill>
+                      <a:schemeClr val="bg1"/>
+                    </a:solidFill>
+                    <a:latin typeface="+mj-lt"/>
+                    <a:ea typeface="+mj-ea"/>
+                    <a:cs typeface="+mj-cs"/>
+                  </a:rPr>
+                  <a:t>FLEXIBLE DECISION MAKING</a:t>
+                </a:r>
               </a:p>
               <a:p>
                 <a:pPr algn="just" defTabSz="4389438">
@@ -10643,7 +10559,29 @@
                     <a:ea typeface="+mj-ea"/>
                     <a:cs typeface="+mj-cs"/>
                   </a:rPr>
-                  <a:t>the flexibility of the energy extraction strategy is limited. We </a:t>
+                  <a:t>the flexibility of </a:t>
+                </a:r>
+                <a:r>
+                  <a:rPr kumimoji="1" lang="en-CA" sz="3200" dirty="0" smtClean="0">
+                    <a:solidFill>
+                      <a:schemeClr val="bg1"/>
+                    </a:solidFill>
+                    <a:latin typeface="+mj-lt"/>
+                    <a:ea typeface="+mj-ea"/>
+                    <a:cs typeface="+mj-cs"/>
+                  </a:rPr>
+                  <a:t>the energy </a:t>
+                </a:r>
+                <a:r>
+                  <a:rPr kumimoji="1" lang="en-CA" sz="3200" dirty="0" smtClean="0">
+                    <a:solidFill>
+                      <a:schemeClr val="bg1"/>
+                    </a:solidFill>
+                    <a:latin typeface="+mj-lt"/>
+                    <a:ea typeface="+mj-ea"/>
+                    <a:cs typeface="+mj-cs"/>
+                  </a:rPr>
+                  <a:t>extraction strategy is limited. We </a:t>
                 </a:r>
                 <a:r>
                   <a:rPr kumimoji="1" lang="en-CA" sz="3200" dirty="0">
@@ -10676,7 +10614,51 @@
                     <a:ea typeface="+mj-ea"/>
                     <a:cs typeface="+mj-cs"/>
                   </a:rPr>
-                  <a:t>, all using machine learning: table-based Q-learning, neural fitted Q-learning, and dynamic programming with neural interpolation. Table-based Q-learning discretizes the state space, and estimates the value of each possible action in each state space chunk. We used this method successfully in a low dimensional setting, but we had difficulty scaling it up. Neural-fitted Q-learning uses a neural network to stores value estimates, but we had difficulty properly incorporating new information into the neural network. Dynamic programming with neural interpolation uses a system model to simulate interactions. To allow for a continuously varying policy, we store the resulting value and policy estimates using neural networks.</a:t>
+                  <a:t>, all using machine learning: table-based Q-learning, neural fitted Q-learning, and dynamic programming with neural interpolation. Table-based Q-learning discretizes the state space, and estimates the value of each possible action in each state space chunk. We used this method successfully in a low dimensional setting, but </a:t>
+                </a:r>
+                <a:r>
+                  <a:rPr kumimoji="1" lang="en-CA" sz="3200" dirty="0" smtClean="0">
+                    <a:solidFill>
+                      <a:schemeClr val="bg1"/>
+                    </a:solidFill>
+                    <a:latin typeface="+mj-lt"/>
+                    <a:ea typeface="+mj-ea"/>
+                    <a:cs typeface="+mj-cs"/>
+                  </a:rPr>
+                  <a:t>had </a:t>
+                </a:r>
+                <a:r>
+                  <a:rPr kumimoji="1" lang="en-CA" sz="3200" dirty="0">
+                    <a:solidFill>
+                      <a:schemeClr val="bg1"/>
+                    </a:solidFill>
+                    <a:latin typeface="+mj-lt"/>
+                    <a:ea typeface="+mj-ea"/>
+                    <a:cs typeface="+mj-cs"/>
+                  </a:rPr>
+                  <a:t>difficulty scaling it up. Neural-fitted Q-learning uses a neural network to </a:t>
+                </a:r>
+                <a:r>
+                  <a:rPr kumimoji="1" lang="en-CA" sz="3200" dirty="0" smtClean="0">
+                    <a:solidFill>
+                      <a:schemeClr val="bg1"/>
+                    </a:solidFill>
+                    <a:latin typeface="+mj-lt"/>
+                    <a:ea typeface="+mj-ea"/>
+                    <a:cs typeface="+mj-cs"/>
+                  </a:rPr>
+                  <a:t>store </a:t>
+                </a:r>
+                <a:r>
+                  <a:rPr kumimoji="1" lang="en-CA" sz="3200" dirty="0">
+                    <a:solidFill>
+                      <a:schemeClr val="bg1"/>
+                    </a:solidFill>
+                    <a:latin typeface="+mj-lt"/>
+                    <a:ea typeface="+mj-ea"/>
+                    <a:cs typeface="+mj-cs"/>
+                  </a:rPr>
+                  <a:t>value estimates, but we had difficulty properly incorporating new information into the neural network. Dynamic programming with neural interpolation uses a system model to simulate interactions. To allow for a continuously varying policy, we store the resulting value and policy estimates using neural networks.</a:t>
                 </a:r>
                 <a:endParaRPr kumimoji="1" lang="en-US" sz="3200" dirty="0">
                   <a:solidFill>
@@ -10700,8 +10682,8 @@
           </p:nvSpPr>
           <p:spPr bwMode="auto">
             <a:xfrm>
-              <a:off x="29758558" y="23267335"/>
-              <a:ext cx="13030200" cy="3539430"/>
+              <a:off x="29565600" y="23267335"/>
+              <a:ext cx="13258800" cy="3539430"/>
             </a:xfrm>
             <a:prstGeom prst="rect">
               <a:avLst/>
@@ -10715,7 +10697,7 @@
             </a:ln>
           </p:spPr>
           <p:txBody>
-            <a:bodyPr>
+            <a:bodyPr wrap="square">
               <a:spAutoFit/>
             </a:bodyPr>
             <a:lstStyle/>
@@ -10743,7 +10725,7 @@
                   <a:ea typeface="+mj-ea"/>
                   <a:cs typeface="+mj-cs"/>
                 </a:rPr>
-                <a:t>dynamic programming with neural interpolation, the learning agent </a:t>
+                <a:t>dynamic programming with neural interpolation, the </a:t>
               </a:r>
               <a:r>
                 <a:rPr kumimoji="1" lang="en-CA" sz="3200" dirty="0" smtClean="0">
@@ -10754,7 +10736,7 @@
                   <a:ea typeface="+mj-ea"/>
                   <a:cs typeface="+mj-cs"/>
                 </a:rPr>
-                <a:t>learned </a:t>
+                <a:t>glider learns a </a:t>
               </a:r>
               <a:r>
                 <a:rPr kumimoji="1" lang="en-CA" sz="3200" dirty="0">
@@ -10765,10 +10747,10 @@
                   <a:ea typeface="+mj-ea"/>
                   <a:cs typeface="+mj-cs"/>
                 </a:rPr>
-                <a:t>a plausible and flexible policy, which adjusted in response to thermal position and shape. This was carried out in an idealized environment, with the following state variables: distance from center of thermal, height of UAV, and direction of UAV. Current work is focused on testing the developed algorithms in the more sophisticated </a:t>
+                <a:t>plausible and </a:t>
               </a:r>
               <a:r>
-                <a:rPr kumimoji="1" lang="en-CA" sz="3200" dirty="0" err="1">
+                <a:rPr kumimoji="1" lang="en-CA" sz="3200" dirty="0" smtClean="0">
                   <a:solidFill>
                     <a:schemeClr val="bg1"/>
                   </a:solidFill>
@@ -10776,7 +10758,7 @@
                   <a:ea typeface="+mj-ea"/>
                   <a:cs typeface="+mj-cs"/>
                 </a:rPr>
-                <a:t>CRRCSim</a:t>
+                <a:t>adaptive policy </a:t>
               </a:r>
               <a:r>
                 <a:rPr kumimoji="1" lang="en-CA" sz="3200" dirty="0">
@@ -10787,7 +10769,7 @@
                   <a:ea typeface="+mj-ea"/>
                   <a:cs typeface="+mj-cs"/>
                 </a:rPr>
-                <a:t> </a:t>
+                <a:t>which </a:t>
               </a:r>
               <a:r>
                 <a:rPr kumimoji="1" lang="en-CA" sz="3200" dirty="0" smtClean="0">
@@ -10798,7 +10780,213 @@
                   <a:ea typeface="+mj-ea"/>
                   <a:cs typeface="+mj-cs"/>
                 </a:rPr>
-                <a:t>simulator, with additional states and additional actions.</a:t>
+                <a:t>adjusts in </a:t>
+              </a:r>
+              <a:r>
+                <a:rPr kumimoji="1" lang="en-CA" sz="3200" dirty="0">
+                  <a:solidFill>
+                    <a:schemeClr val="bg1"/>
+                  </a:solidFill>
+                  <a:latin typeface="+mj-lt"/>
+                  <a:ea typeface="+mj-ea"/>
+                  <a:cs typeface="+mj-cs"/>
+                </a:rPr>
+                <a:t>response to thermal position and shape. This </a:t>
+              </a:r>
+              <a:r>
+                <a:rPr kumimoji="1" lang="en-CA" sz="3200" dirty="0" smtClean="0">
+                  <a:solidFill>
+                    <a:schemeClr val="bg1"/>
+                  </a:solidFill>
+                  <a:latin typeface="+mj-lt"/>
+                  <a:ea typeface="+mj-ea"/>
+                  <a:cs typeface="+mj-cs"/>
+                </a:rPr>
+                <a:t>learning occurred in an </a:t>
+              </a:r>
+              <a:r>
+                <a:rPr kumimoji="1" lang="en-CA" sz="3200" dirty="0">
+                  <a:solidFill>
+                    <a:schemeClr val="bg1"/>
+                  </a:solidFill>
+                  <a:latin typeface="+mj-lt"/>
+                  <a:ea typeface="+mj-ea"/>
+                  <a:cs typeface="+mj-cs"/>
+                </a:rPr>
+                <a:t>idealized </a:t>
+              </a:r>
+              <a:r>
+                <a:rPr kumimoji="1" lang="en-CA" sz="3200" dirty="0" smtClean="0">
+                  <a:solidFill>
+                    <a:schemeClr val="bg1"/>
+                  </a:solidFill>
+                  <a:latin typeface="+mj-lt"/>
+                  <a:ea typeface="+mj-ea"/>
+                  <a:cs typeface="+mj-cs"/>
+                </a:rPr>
+                <a:t>environment </a:t>
+              </a:r>
+              <a:r>
+                <a:rPr kumimoji="1" lang="en-CA" sz="3200" dirty="0">
+                  <a:solidFill>
+                    <a:schemeClr val="bg1"/>
+                  </a:solidFill>
+                  <a:latin typeface="+mj-lt"/>
+                  <a:ea typeface="+mj-ea"/>
+                  <a:cs typeface="+mj-cs"/>
+                </a:rPr>
+                <a:t>with the following state variables: </a:t>
+              </a:r>
+              <a:r>
+                <a:rPr kumimoji="1" lang="en-CA" sz="3200" dirty="0" smtClean="0">
+                  <a:solidFill>
+                    <a:schemeClr val="bg1"/>
+                  </a:solidFill>
+                  <a:latin typeface="+mj-lt"/>
+                  <a:ea typeface="+mj-ea"/>
+                  <a:cs typeface="+mj-cs"/>
+                </a:rPr>
+                <a:t>distance of glider from thermal center, </a:t>
+              </a:r>
+              <a:r>
+                <a:rPr kumimoji="1" lang="en-CA" sz="3200" dirty="0">
+                  <a:solidFill>
+                    <a:schemeClr val="bg1"/>
+                  </a:solidFill>
+                  <a:latin typeface="+mj-lt"/>
+                  <a:ea typeface="+mj-ea"/>
+                  <a:cs typeface="+mj-cs"/>
+                </a:rPr>
+                <a:t>height of </a:t>
+              </a:r>
+              <a:r>
+                <a:rPr kumimoji="1" lang="en-CA" sz="3200" dirty="0" smtClean="0">
+                  <a:solidFill>
+                    <a:schemeClr val="bg1"/>
+                  </a:solidFill>
+                  <a:latin typeface="+mj-lt"/>
+                  <a:ea typeface="+mj-ea"/>
+                  <a:cs typeface="+mj-cs"/>
+                </a:rPr>
+                <a:t>glider, </a:t>
+              </a:r>
+              <a:r>
+                <a:rPr kumimoji="1" lang="en-CA" sz="3200" dirty="0">
+                  <a:solidFill>
+                    <a:schemeClr val="bg1"/>
+                  </a:solidFill>
+                  <a:latin typeface="+mj-lt"/>
+                  <a:ea typeface="+mj-ea"/>
+                  <a:cs typeface="+mj-cs"/>
+                </a:rPr>
+                <a:t>and direction of </a:t>
+              </a:r>
+              <a:r>
+                <a:rPr kumimoji="1" lang="en-CA" sz="3200" dirty="0">
+                  <a:solidFill>
+                    <a:schemeClr val="bg1"/>
+                  </a:solidFill>
+                </a:rPr>
+                <a:t>glider</a:t>
+              </a:r>
+              <a:r>
+                <a:rPr kumimoji="1" lang="en-CA" sz="3200" dirty="0" smtClean="0">
+                  <a:solidFill>
+                    <a:schemeClr val="bg1"/>
+                  </a:solidFill>
+                  <a:latin typeface="+mj-lt"/>
+                  <a:ea typeface="+mj-ea"/>
+                  <a:cs typeface="+mj-cs"/>
+                </a:rPr>
+                <a:t>. </a:t>
+              </a:r>
+              <a:r>
+                <a:rPr kumimoji="1" lang="en-CA" sz="3200" dirty="0">
+                  <a:solidFill>
+                    <a:schemeClr val="bg1"/>
+                  </a:solidFill>
+                  <a:latin typeface="+mj-lt"/>
+                  <a:ea typeface="+mj-ea"/>
+                  <a:cs typeface="+mj-cs"/>
+                </a:rPr>
+                <a:t>Current work is focused on testing the developed </a:t>
+              </a:r>
+              <a:r>
+                <a:rPr kumimoji="1" lang="en-CA" sz="3200" dirty="0" smtClean="0">
+                  <a:solidFill>
+                    <a:schemeClr val="bg1"/>
+                  </a:solidFill>
+                  <a:latin typeface="+mj-lt"/>
+                  <a:ea typeface="+mj-ea"/>
+                  <a:cs typeface="+mj-cs"/>
+                </a:rPr>
+                <a:t>algorithm </a:t>
+              </a:r>
+              <a:r>
+                <a:rPr kumimoji="1" lang="en-CA" sz="3200" dirty="0">
+                  <a:solidFill>
+                    <a:schemeClr val="bg1"/>
+                  </a:solidFill>
+                  <a:latin typeface="+mj-lt"/>
+                  <a:ea typeface="+mj-ea"/>
+                  <a:cs typeface="+mj-cs"/>
+                </a:rPr>
+                <a:t>in the </a:t>
+              </a:r>
+              <a:r>
+                <a:rPr kumimoji="1" lang="en-CA" sz="3200" dirty="0" smtClean="0">
+                  <a:solidFill>
+                    <a:schemeClr val="bg1"/>
+                  </a:solidFill>
+                  <a:latin typeface="+mj-lt"/>
+                  <a:ea typeface="+mj-ea"/>
+                  <a:cs typeface="+mj-cs"/>
+                </a:rPr>
+                <a:t>more sophisticated </a:t>
+              </a:r>
+              <a:r>
+                <a:rPr kumimoji="1" lang="en-CA" sz="3200" dirty="0" smtClean="0">
+                  <a:solidFill>
+                    <a:schemeClr val="bg1"/>
+                  </a:solidFill>
+                  <a:latin typeface="+mj-lt"/>
+                  <a:ea typeface="+mj-ea"/>
+                  <a:cs typeface="+mj-cs"/>
+                </a:rPr>
+                <a:t>CRRCSim </a:t>
+              </a:r>
+              <a:r>
+                <a:rPr kumimoji="1" lang="en-CA" sz="3200" dirty="0" smtClean="0">
+                  <a:solidFill>
+                    <a:schemeClr val="bg1"/>
+                  </a:solidFill>
+                  <a:latin typeface="+mj-lt"/>
+                  <a:ea typeface="+mj-ea"/>
+                  <a:cs typeface="+mj-cs"/>
+                </a:rPr>
+                <a:t>simulator, with additional states and </a:t>
+              </a:r>
+              <a:r>
+                <a:rPr kumimoji="1" lang="en-CA" sz="3200" dirty="0" smtClean="0">
+                  <a:solidFill>
+                    <a:schemeClr val="bg1"/>
+                  </a:solidFill>
+                  <a:latin typeface="+mj-lt"/>
+                  <a:ea typeface="+mj-ea"/>
+                  <a:cs typeface="+mj-cs"/>
+                </a:rPr>
+                <a:t>actions</a:t>
+              </a:r>
+              <a:r>
+                <a:rPr kumimoji="1" lang="en-CA" sz="3200" dirty="0" smtClean="0">
+                  <a:solidFill>
+                    <a:schemeClr val="bg1"/>
+                  </a:solidFill>
+                  <a:latin typeface="+mj-lt"/>
+                  <a:ea typeface="+mj-ea"/>
+                  <a:cs typeface="+mj-cs"/>
+                </a:rPr>
+                <a:t>.</a:t>
               </a:r>
               <a:endParaRPr kumimoji="1" lang="en-CA" sz="3200" dirty="0">
                 <a:solidFill>
@@ -10820,8 +11008,8 @@
         </p:nvSpPr>
         <p:spPr>
           <a:xfrm>
-            <a:off x="29565600" y="22020213"/>
-            <a:ext cx="13223158" cy="1015663"/>
+            <a:off x="29565600" y="22315214"/>
+            <a:ext cx="13223158" cy="707886"/>
           </a:xfrm>
           <a:prstGeom prst="rect">
             <a:avLst/>
@@ -10846,7 +11034,51 @@
                 <a:ea typeface="+mj-ea"/>
                 <a:cs typeface="+mj-cs"/>
               </a:rPr>
-              <a:t>Figure 4: Value and policy estimates with thermal at 5, and with the UAV facing the origin. </a:t>
+              <a:t>Figure 4: Value and policy </a:t>
+            </a:r>
+            <a:r>
+              <a:rPr kumimoji="1" lang="en-US" sz="2000" dirty="0" smtClean="0">
+                <a:solidFill>
+                  <a:schemeClr val="bg1"/>
+                </a:solidFill>
+                <a:latin typeface="+mj-lt"/>
+                <a:ea typeface="+mj-ea"/>
+                <a:cs typeface="+mj-cs"/>
+              </a:rPr>
+              <a:t>estimates. The thermal is at </a:t>
+            </a:r>
+            <a:r>
+              <a:rPr kumimoji="1" lang="en-US" sz="2000" dirty="0" smtClean="0">
+                <a:solidFill>
+                  <a:schemeClr val="bg1"/>
+                </a:solidFill>
+                <a:latin typeface="+mj-lt"/>
+                <a:ea typeface="+mj-ea"/>
+                <a:cs typeface="+mj-cs"/>
+              </a:rPr>
+              <a:t>5, and </a:t>
+            </a:r>
+            <a:r>
+              <a:rPr kumimoji="1" lang="en-US" sz="2000" dirty="0" smtClean="0">
+                <a:solidFill>
+                  <a:schemeClr val="bg1"/>
+                </a:solidFill>
+                <a:latin typeface="+mj-lt"/>
+                <a:ea typeface="+mj-ea"/>
+                <a:cs typeface="+mj-cs"/>
+              </a:rPr>
+              <a:t>the UAV faces the </a:t>
+            </a:r>
+            <a:r>
+              <a:rPr kumimoji="1" lang="en-US" sz="2000" dirty="0" smtClean="0">
+                <a:solidFill>
+                  <a:schemeClr val="bg1"/>
+                </a:solidFill>
+                <a:latin typeface="+mj-lt"/>
+                <a:ea typeface="+mj-ea"/>
+                <a:cs typeface="+mj-cs"/>
+              </a:rPr>
+              <a:t>origin. </a:t>
             </a:r>
           </a:p>
           <a:p>
@@ -10862,13 +11094,8 @@
                 <a:ea typeface="+mj-ea"/>
                 <a:cs typeface="+mj-cs"/>
               </a:rPr>
-              <a:t>In the value plot (above), the legend refers to the UAV height. </a:t>
+              <a:t>In </a:t>
             </a:r>
-          </a:p>
-          <a:p>
-            <a:pPr algn="ctr">
-              <a:defRPr/>
-            </a:pPr>
             <a:r>
               <a:rPr kumimoji="1" lang="en-US" sz="2000" dirty="0" smtClean="0">
                 <a:solidFill>
@@ -10878,7 +11105,7 @@
                 <a:ea typeface="+mj-ea"/>
                 <a:cs typeface="+mj-cs"/>
               </a:rPr>
-              <a:t>In the policy plot (below), blue = travel towards origin, green = travel away from origin, and red = orbit.</a:t>
+              <a:t>the policy plot (below), blue = travel towards origin, green = travel away from origin, and red = orbit.</a:t>
             </a:r>
             <a:endParaRPr kumimoji="1" lang="en-US" sz="2000" dirty="0">
               <a:solidFill>
@@ -11075,36 +11302,12 @@
       </p:sp>
       <p:pic>
         <p:nvPicPr>
-          <p:cNvPr id="10" name="Picture 9"/>
-          <p:cNvPicPr>
-            <a:picLocks noChangeAspect="1"/>
-          </p:cNvPicPr>
-          <p:nvPr/>
-        </p:nvPicPr>
-        <p:blipFill>
-          <a:blip r:embed="rId8"/>
-          <a:stretch>
-            <a:fillRect/>
-          </a:stretch>
-        </p:blipFill>
-        <p:spPr>
-          <a:xfrm>
-            <a:off x="30917075" y="14016551"/>
-            <a:ext cx="10555850" cy="8003662"/>
-          </a:xfrm>
-          <a:prstGeom prst="rect">
-            <a:avLst/>
-          </a:prstGeom>
-        </p:spPr>
-      </p:pic>
-      <p:pic>
-        <p:nvPicPr>
           <p:cNvPr id="55" name="Picture 54" descr="https://lh3.googleusercontent.com/SkIHU5SnK2tBcy8bv1TLiFLUYxR7PFd-Qr_nY9Z__kUbBy5qYndsjBKQdsOjwddnQf2kcx-kqgvALrbrKawQ6pBylPSPYRZIdeG3tOhw1rCck8weyQ_-XtJKXON4UEcl3PXgWf7R"/>
           <p:cNvPicPr/>
           <p:nvPr/>
         </p:nvPicPr>
         <p:blipFill>
-          <a:blip r:embed="rId9" cstate="print">
+          <a:blip r:embed="rId8" cstate="print">
             <a:extLst>
               <a:ext uri="{28A0092B-C50C-407E-A947-70E740481C1C}">
                 <a14:useLocalDpi xmlns:a14="http://schemas.microsoft.com/office/drawing/2010/main" val="0"/>
@@ -11118,7 +11321,7 @@
         </p:blipFill>
         <p:spPr bwMode="auto">
           <a:xfrm>
-            <a:off x="1212129" y="19482848"/>
+            <a:off x="1212129" y="19365913"/>
             <a:ext cx="12846771" cy="1091152"/>
           </a:xfrm>
           <a:prstGeom prst="rect">
@@ -11334,14 +11537,6 @@
               </a:rPr>
               <a:t>You may have noticed that hawks and other birds tend to soar in large circles or loops in the sky. What they’re actually doing is taking advantage of hot air rising in the atmosphere. By flying in that hot section of air they rise with it and can soar for hours with little effort. This project seeks to mimic these birds using sensors and software.</a:t>
             </a:r>
-            <a:endParaRPr kumimoji="1" lang="en-US" sz="3200" dirty="0" smtClean="0">
-              <a:solidFill>
-                <a:schemeClr val="bg1"/>
-              </a:solidFill>
-              <a:latin typeface="+mj-lt"/>
-              <a:ea typeface="+mj-ea"/>
-              <a:cs typeface="+mj-cs"/>
-            </a:endParaRPr>
           </a:p>
         </p:txBody>
       </p:sp>
@@ -11356,7 +11551,7 @@
         <p:spPr bwMode="auto">
           <a:xfrm>
             <a:off x="1066799" y="14505373"/>
-            <a:ext cx="13182600" cy="6093956"/>
+            <a:ext cx="13182600" cy="5601513"/>
           </a:xfrm>
           <a:prstGeom prst="rect">
             <a:avLst/>
@@ -11547,7 +11742,51 @@
                 <a:ea typeface="+mj-ea"/>
                 <a:cs typeface="+mj-cs"/>
               </a:rPr>
-              <a:t>After researching the subject, the basic implementation we decided on was a combination of a paper from Daniel Edwards and a paper from Michael Allen, one of our sponsors on the project.</a:t>
+              <a:t>After researching the subject, the basic implementation we decided on was a combination of a paper </a:t>
+            </a:r>
+            <a:r>
+              <a:rPr kumimoji="1" lang="en-US" sz="3200" dirty="0" smtClean="0">
+                <a:solidFill>
+                  <a:schemeClr val="bg1"/>
+                </a:solidFill>
+                <a:latin typeface="+mj-lt"/>
+                <a:ea typeface="+mj-ea"/>
+                <a:cs typeface="+mj-cs"/>
+              </a:rPr>
+              <a:t>by Daniel </a:t>
+            </a:r>
+            <a:r>
+              <a:rPr kumimoji="1" lang="en-US" sz="3200" dirty="0" smtClean="0">
+                <a:solidFill>
+                  <a:schemeClr val="bg1"/>
+                </a:solidFill>
+                <a:latin typeface="+mj-lt"/>
+                <a:ea typeface="+mj-ea"/>
+                <a:cs typeface="+mj-cs"/>
+              </a:rPr>
+              <a:t>Edwards and a paper </a:t>
+            </a:r>
+            <a:r>
+              <a:rPr kumimoji="1" lang="en-US" sz="3200" dirty="0" smtClean="0">
+                <a:solidFill>
+                  <a:schemeClr val="bg1"/>
+                </a:solidFill>
+                <a:latin typeface="+mj-lt"/>
+                <a:ea typeface="+mj-ea"/>
+                <a:cs typeface="+mj-cs"/>
+              </a:rPr>
+              <a:t>by Michael </a:t>
+            </a:r>
+            <a:r>
+              <a:rPr kumimoji="1" lang="en-US" sz="3200" dirty="0" smtClean="0">
+                <a:solidFill>
+                  <a:schemeClr val="bg1"/>
+                </a:solidFill>
+                <a:latin typeface="+mj-lt"/>
+                <a:ea typeface="+mj-ea"/>
+                <a:cs typeface="+mj-cs"/>
+              </a:rPr>
+              <a:t>Allen, one of our sponsors on the project.</a:t>
             </a:r>
           </a:p>
           <a:p>
@@ -11576,7 +11815,128 @@
                 <a:ea typeface="+mj-ea"/>
                 <a:cs typeface="+mj-cs"/>
               </a:rPr>
-              <a:t>The first step was to create an equation capable of using sensor data on the glider to find how much thermal energy was in the air. This resulted in the following energy equation, which we continuously calculate at a rate of 20 Hz.</a:t>
+              <a:t>The first step was to create an equation </a:t>
+            </a:r>
+            <a:r>
+              <a:rPr kumimoji="1" lang="en-US" sz="3200" dirty="0" smtClean="0">
+                <a:solidFill>
+                  <a:schemeClr val="bg1"/>
+                </a:solidFill>
+                <a:latin typeface="+mj-lt"/>
+                <a:ea typeface="+mj-ea"/>
+                <a:cs typeface="+mj-cs"/>
+              </a:rPr>
+              <a:t>that uses sensor </a:t>
+            </a:r>
+            <a:r>
+              <a:rPr kumimoji="1" lang="en-US" sz="3200" dirty="0" smtClean="0">
+                <a:solidFill>
+                  <a:schemeClr val="bg1"/>
+                </a:solidFill>
+                <a:latin typeface="+mj-lt"/>
+                <a:ea typeface="+mj-ea"/>
+                <a:cs typeface="+mj-cs"/>
+              </a:rPr>
+              <a:t>data </a:t>
+            </a:r>
+            <a:r>
+              <a:rPr kumimoji="1" lang="en-US" sz="3200" dirty="0" smtClean="0">
+                <a:solidFill>
+                  <a:schemeClr val="bg1"/>
+                </a:solidFill>
+                <a:latin typeface="+mj-lt"/>
+                <a:ea typeface="+mj-ea"/>
+                <a:cs typeface="+mj-cs"/>
+              </a:rPr>
+              <a:t>from the </a:t>
+            </a:r>
+            <a:r>
+              <a:rPr kumimoji="1" lang="en-US" sz="3200" dirty="0" smtClean="0">
+                <a:solidFill>
+                  <a:schemeClr val="bg1"/>
+                </a:solidFill>
+                <a:latin typeface="+mj-lt"/>
+                <a:ea typeface="+mj-ea"/>
+                <a:cs typeface="+mj-cs"/>
+              </a:rPr>
+              <a:t>glider to find how much thermal energy </a:t>
+            </a:r>
+            <a:r>
+              <a:rPr kumimoji="1" lang="en-US" sz="3200" dirty="0" smtClean="0">
+                <a:solidFill>
+                  <a:schemeClr val="bg1"/>
+                </a:solidFill>
+                <a:latin typeface="+mj-lt"/>
+                <a:ea typeface="+mj-ea"/>
+                <a:cs typeface="+mj-cs"/>
+              </a:rPr>
+              <a:t>is in </a:t>
+            </a:r>
+            <a:r>
+              <a:rPr kumimoji="1" lang="en-US" sz="3200" dirty="0" smtClean="0">
+                <a:solidFill>
+                  <a:schemeClr val="bg1"/>
+                </a:solidFill>
+                <a:latin typeface="+mj-lt"/>
+                <a:ea typeface="+mj-ea"/>
+                <a:cs typeface="+mj-cs"/>
+              </a:rPr>
+              <a:t>the air. </a:t>
+            </a:r>
+            <a:r>
+              <a:rPr kumimoji="1" lang="en-US" sz="3200" dirty="0" smtClean="0">
+                <a:solidFill>
+                  <a:schemeClr val="bg1"/>
+                </a:solidFill>
+                <a:latin typeface="+mj-lt"/>
+                <a:ea typeface="+mj-ea"/>
+                <a:cs typeface="+mj-cs"/>
+              </a:rPr>
+              <a:t>Here is the resulting energy equation, </a:t>
+            </a:r>
+            <a:r>
+              <a:rPr kumimoji="1" lang="en-US" sz="3200" dirty="0" smtClean="0">
+                <a:solidFill>
+                  <a:schemeClr val="bg1"/>
+                </a:solidFill>
+                <a:latin typeface="+mj-lt"/>
+                <a:ea typeface="+mj-ea"/>
+                <a:cs typeface="+mj-cs"/>
+              </a:rPr>
+              <a:t>which we </a:t>
+            </a:r>
+            <a:r>
+              <a:rPr kumimoji="1" lang="en-US" sz="3200" dirty="0" smtClean="0">
+                <a:solidFill>
+                  <a:schemeClr val="bg1"/>
+                </a:solidFill>
+                <a:latin typeface="+mj-lt"/>
+                <a:ea typeface="+mj-ea"/>
+                <a:cs typeface="+mj-cs"/>
+              </a:rPr>
+              <a:t>recalculate at </a:t>
+            </a:r>
+            <a:r>
+              <a:rPr kumimoji="1" lang="en-US" sz="3200" dirty="0" smtClean="0">
+                <a:solidFill>
+                  <a:schemeClr val="bg1"/>
+                </a:solidFill>
+                <a:latin typeface="+mj-lt"/>
+                <a:ea typeface="+mj-ea"/>
+                <a:cs typeface="+mj-cs"/>
+              </a:rPr>
+              <a:t>a rate of 20 </a:t>
+            </a:r>
+            <a:r>
+              <a:rPr kumimoji="1" lang="en-US" sz="3200" dirty="0" smtClean="0">
+                <a:solidFill>
+                  <a:schemeClr val="bg1"/>
+                </a:solidFill>
+                <a:latin typeface="+mj-lt"/>
+                <a:ea typeface="+mj-ea"/>
+                <a:cs typeface="+mj-cs"/>
+              </a:rPr>
+              <a:t>Hz:</a:t>
             </a:r>
             <a:endParaRPr kumimoji="1" lang="en-US" sz="3200" dirty="0" smtClean="0">
               <a:solidFill>
@@ -11782,16 +12142,74 @@
                 <a:ea typeface="+mj-ea"/>
                 <a:cs typeface="+mj-cs"/>
               </a:rPr>
-              <a:t>The next step uses that energy data to decide whether to actually try and use this thermal or not. If the thermal looks strong enough, the glider latches onto it and moves to Michael Allen’s centroid method to find where the center of the thermal is.</a:t>
+              <a:t>The next step </a:t>
             </a:r>
-            <a:endParaRPr kumimoji="1" lang="en-US" sz="3200" dirty="0" smtClean="0">
-              <a:solidFill>
-                <a:schemeClr val="bg1"/>
-              </a:solidFill>
-              <a:latin typeface="+mj-lt"/>
-              <a:ea typeface="+mj-ea"/>
-              <a:cs typeface="+mj-cs"/>
-            </a:endParaRPr>
+            <a:r>
+              <a:rPr kumimoji="1" lang="en-US" sz="3200" dirty="0" smtClean="0">
+                <a:solidFill>
+                  <a:schemeClr val="bg1"/>
+                </a:solidFill>
+                <a:latin typeface="+mj-lt"/>
+                <a:ea typeface="+mj-ea"/>
+                <a:cs typeface="+mj-cs"/>
+              </a:rPr>
+              <a:t>was to use the energy </a:t>
+            </a:r>
+            <a:r>
+              <a:rPr kumimoji="1" lang="en-US" sz="3200" dirty="0" smtClean="0">
+                <a:solidFill>
+                  <a:schemeClr val="bg1"/>
+                </a:solidFill>
+                <a:latin typeface="+mj-lt"/>
+                <a:ea typeface="+mj-ea"/>
+                <a:cs typeface="+mj-cs"/>
+              </a:rPr>
+              <a:t>data to decide whether to </a:t>
+            </a:r>
+            <a:r>
+              <a:rPr kumimoji="1" lang="en-US" sz="3200" dirty="0" smtClean="0">
+                <a:solidFill>
+                  <a:schemeClr val="bg1"/>
+                </a:solidFill>
+                <a:latin typeface="+mj-lt"/>
+                <a:ea typeface="+mj-ea"/>
+                <a:cs typeface="+mj-cs"/>
+              </a:rPr>
+              <a:t>use the current thermal </a:t>
+            </a:r>
+            <a:r>
+              <a:rPr kumimoji="1" lang="en-US" sz="3200" dirty="0" smtClean="0">
+                <a:solidFill>
+                  <a:schemeClr val="bg1"/>
+                </a:solidFill>
+                <a:latin typeface="+mj-lt"/>
+                <a:ea typeface="+mj-ea"/>
+                <a:cs typeface="+mj-cs"/>
+              </a:rPr>
+              <a:t>or not. If the thermal looks strong enough, the glider latches onto it and </a:t>
+            </a:r>
+            <a:r>
+              <a:rPr kumimoji="1" lang="en-US" sz="3200" dirty="0" smtClean="0">
+                <a:solidFill>
+                  <a:schemeClr val="bg1"/>
+                </a:solidFill>
+                <a:latin typeface="+mj-lt"/>
+                <a:ea typeface="+mj-ea"/>
+                <a:cs typeface="+mj-cs"/>
+              </a:rPr>
+              <a:t>uses Michael </a:t>
+            </a:r>
+            <a:r>
+              <a:rPr kumimoji="1" lang="en-US" sz="3200" dirty="0" smtClean="0">
+                <a:solidFill>
+                  <a:schemeClr val="bg1"/>
+                </a:solidFill>
+                <a:latin typeface="+mj-lt"/>
+                <a:ea typeface="+mj-ea"/>
+                <a:cs typeface="+mj-cs"/>
+              </a:rPr>
+              <a:t>Allen’s centroid method to find where the center of the thermal is.</a:t>
+            </a:r>
           </a:p>
         </p:txBody>
       </p:sp>
@@ -11837,7 +12255,7 @@
                 <a:ea typeface="+mj-ea"/>
                 <a:cs typeface="+mj-cs"/>
               </a:rPr>
-              <a:t>RESULTS. </a:t>
+              <a:t>RESULTS. While not the most efficient, this method seems to work well for most simple use cases. In simulation with the Piccolo autopilot it was able to detect and orbit a variety of thermals in its path. However it does not always provide the best use of the </a:t>
             </a:r>
             <a:r>
               <a:rPr kumimoji="1" lang="en-US" sz="3200" dirty="0" smtClean="0">
@@ -11848,7 +12266,18 @@
                 <a:ea typeface="+mj-ea"/>
                 <a:cs typeface="+mj-cs"/>
               </a:rPr>
-              <a:t>While not the most efficient, this method seems to work well for most simple use cases. In simulation with the Piccolo autopilot it was able to detect and orbit a variety of thermals in its path. However it does not always provide the best use of the thermal, leading to possible improvements.</a:t>
+              <a:t>thermal, and so we focused on improvements in th</a:t>
+            </a:r>
+            <a:r>
+              <a:rPr kumimoji="1" lang="en-US" sz="3200" dirty="0" smtClean="0">
+                <a:solidFill>
+                  <a:schemeClr val="bg1"/>
+                </a:solidFill>
+                <a:latin typeface="+mj-lt"/>
+                <a:ea typeface="+mj-ea"/>
+                <a:cs typeface="+mj-cs"/>
+              </a:rPr>
+              <a:t>e remainder of our work.</a:t>
             </a:r>
             <a:endParaRPr kumimoji="1" lang="en-US" sz="3200" dirty="0">
               <a:solidFill>
@@ -11879,7 +12308,7 @@
         </p:xfrm>
         <a:graphic>
           <a:graphicData uri="http://schemas.openxmlformats.org/drawingml/2006/diagram">
-            <dgm:relIds xmlns:dgm="http://schemas.openxmlformats.org/drawingml/2006/diagram" xmlns:r="http://schemas.openxmlformats.org/officeDocument/2006/relationships" r:dm="rId10" r:lo="rId11" r:qs="rId12" r:cs="rId13"/>
+            <dgm:relIds xmlns:dgm="http://schemas.openxmlformats.org/drawingml/2006/diagram" xmlns:r="http://schemas.openxmlformats.org/officeDocument/2006/relationships" r:dm="rId9" r:lo="rId10" r:qs="rId11" r:cs="rId12"/>
           </a:graphicData>
         </a:graphic>
       </p:graphicFrame>
@@ -12065,14 +12494,6 @@
               </a:rPr>
               <a:t>The centroid method examines the relation between the location of the glider and the energy data, and then selects the range where the energy seems to be highest as the likely center point. It then adjusts for the movement of the thermal by comparing old and new data before giving a final value for the thermal center.</a:t>
             </a:r>
-            <a:endParaRPr kumimoji="1" lang="en-US" sz="3200" dirty="0" smtClean="0">
-              <a:solidFill>
-                <a:schemeClr val="bg1"/>
-              </a:solidFill>
-              <a:latin typeface="+mj-lt"/>
-              <a:ea typeface="+mj-ea"/>
-              <a:cs typeface="+mj-cs"/>
-            </a:endParaRPr>
           </a:p>
         </p:txBody>
       </p:sp>
@@ -12256,7 +12677,29 @@
                 <a:ea typeface="+mj-ea"/>
                 <a:cs typeface="+mj-cs"/>
               </a:rPr>
-              <a:t>While the energy remains high enough to gain continous lift, the aircraft then orbits this center point, constantly updating it by running the cycle shown in Figure 1. If the energy drops too low, it unlatches and continues on its original route.</a:t>
+              <a:t>While the energy remains high enough to gain </a:t>
+            </a:r>
+            <a:r>
+              <a:rPr kumimoji="1" lang="en-US" sz="3200" dirty="0" smtClean="0">
+                <a:solidFill>
+                  <a:schemeClr val="bg1"/>
+                </a:solidFill>
+                <a:latin typeface="+mj-lt"/>
+                <a:ea typeface="+mj-ea"/>
+                <a:cs typeface="+mj-cs"/>
+              </a:rPr>
+              <a:t>continuous </a:t>
+            </a:r>
+            <a:r>
+              <a:rPr kumimoji="1" lang="en-US" sz="3200" dirty="0" smtClean="0">
+                <a:solidFill>
+                  <a:schemeClr val="bg1"/>
+                </a:solidFill>
+                <a:latin typeface="+mj-lt"/>
+                <a:ea typeface="+mj-ea"/>
+                <a:cs typeface="+mj-cs"/>
+              </a:rPr>
+              <a:t>lift, the aircraft then orbits this center point, constantly updating it by running the cycle shown in Figure 1. If the energy drops too low, it unlatches and continues on its original route.</a:t>
             </a:r>
           </a:p>
           <a:p>
@@ -12343,18 +12786,7 @@
                 <a:ea typeface="+mj-ea"/>
                 <a:cs typeface="+mj-cs"/>
               </a:rPr>
-              <a:t>1:  </a:t>
-            </a:r>
-            <a:r>
-              <a:rPr kumimoji="1" lang="en-US" sz="2000" dirty="0" smtClean="0">
-                <a:solidFill>
-                  <a:schemeClr val="bg1"/>
-                </a:solidFill>
-                <a:latin typeface="+mj-lt"/>
-                <a:ea typeface="+mj-ea"/>
-                <a:cs typeface="+mj-cs"/>
-              </a:rPr>
-              <a:t>The Process Cycle</a:t>
+              <a:t>1:  The Process Cycle</a:t>
             </a:r>
             <a:endParaRPr kumimoji="1" lang="en-US" sz="2000" dirty="0">
               <a:solidFill>
@@ -12367,6 +12799,30 @@
           </a:p>
         </p:txBody>
       </p:sp>
+      <p:pic>
+        <p:nvPicPr>
+          <p:cNvPr id="11" name="Picture 10"/>
+          <p:cNvPicPr>
+            <a:picLocks noChangeAspect="1"/>
+          </p:cNvPicPr>
+          <p:nvPr/>
+        </p:nvPicPr>
+        <p:blipFill>
+          <a:blip r:embed="rId14"/>
+          <a:stretch>
+            <a:fillRect/>
+          </a:stretch>
+        </p:blipFill>
+        <p:spPr>
+          <a:xfrm>
+            <a:off x="30755856" y="13914262"/>
+            <a:ext cx="10954487" cy="8304846"/>
+          </a:xfrm>
+          <a:prstGeom prst="rect">
+            <a:avLst/>
+          </a:prstGeom>
+        </p:spPr>
+      </p:pic>
     </p:spTree>
     <p:custDataLst>
       <p:tags r:id="rId1"/>

</xml_diff>

<commit_message>
Adjusted whitespace, slight rewording of GPR figure
</commit_message>
<xml_diff>
--- a/Poster.pptx
+++ b/Poster.pptx
@@ -9253,9 +9253,9 @@
         <p:grpSpPr bwMode="auto">
           <a:xfrm>
             <a:off x="1066800" y="6324597"/>
-            <a:ext cx="13182600" cy="4342852"/>
+            <a:ext cx="13182600" cy="3818910"/>
             <a:chOff x="1066800" y="25069800"/>
-            <a:chExt cx="13182600" cy="3810000"/>
+            <a:chExt cx="13182600" cy="3437405"/>
           </a:xfrm>
           <a:effectLst>
             <a:outerShdw blurRad="50800" dist="50800" dir="5400000" algn="ctr" rotWithShape="0">
@@ -9274,7 +9274,7 @@
           <p:spPr bwMode="auto">
             <a:xfrm>
               <a:off x="1066800" y="25069800"/>
-              <a:ext cx="13182600" cy="3810000"/>
+              <a:ext cx="13182600" cy="3437405"/>
             </a:xfrm>
             <a:prstGeom prst="rect">
               <a:avLst/>
@@ -9832,7 +9832,7 @@
         <p:spPr bwMode="auto">
           <a:xfrm>
             <a:off x="15125700" y="22160711"/>
-            <a:ext cx="13335000" cy="400110"/>
+            <a:ext cx="13335000" cy="707886"/>
           </a:xfrm>
           <a:prstGeom prst="rect">
             <a:avLst/>
@@ -9877,7 +9877,62 @@
                 <a:ea typeface="+mj-ea"/>
                 <a:cs typeface="+mj-cs"/>
               </a:rPr>
-              <a:t>3:  Gaussian process regression (left) runs live on data collected from a glider flying in the simulator (right)</a:t>
+              <a:t>3:  Gaussian process regression (left) </a:t>
+            </a:r>
+            <a:r>
+              <a:rPr kumimoji="1" lang="en-US" sz="2000" dirty="0" smtClean="0">
+                <a:solidFill>
+                  <a:schemeClr val="bg1"/>
+                </a:solidFill>
+                <a:latin typeface="+mj-lt"/>
+                <a:ea typeface="+mj-ea"/>
+                <a:cs typeface="+mj-cs"/>
+              </a:rPr>
+              <a:t>running live on vertical velocity measurements </a:t>
+            </a:r>
+            <a:r>
+              <a:rPr kumimoji="1" lang="en-US" sz="2000" dirty="0" smtClean="0">
+                <a:solidFill>
+                  <a:schemeClr val="bg1"/>
+                </a:solidFill>
+                <a:latin typeface="+mj-lt"/>
+                <a:ea typeface="+mj-ea"/>
+                <a:cs typeface="+mj-cs"/>
+              </a:rPr>
+              <a:t>collected from a glider flying in the </a:t>
+            </a:r>
+            <a:r>
+              <a:rPr kumimoji="1" lang="en-US" sz="2000" dirty="0" err="1" smtClean="0">
+                <a:solidFill>
+                  <a:schemeClr val="bg1"/>
+                </a:solidFill>
+                <a:latin typeface="+mj-lt"/>
+                <a:ea typeface="+mj-ea"/>
+                <a:cs typeface="+mj-cs"/>
+              </a:rPr>
+              <a:t>CRRCSim</a:t>
+            </a:r>
+            <a:r>
+              <a:rPr kumimoji="1" lang="en-US" sz="2000" dirty="0" smtClean="0">
+                <a:solidFill>
+                  <a:schemeClr val="bg1"/>
+                </a:solidFill>
+                <a:latin typeface="+mj-lt"/>
+                <a:ea typeface="+mj-ea"/>
+                <a:cs typeface="+mj-cs"/>
+              </a:rPr>
+              <a:t> simulator </a:t>
+            </a:r>
+            <a:r>
+              <a:rPr kumimoji="1" lang="en-US" sz="2000" dirty="0" smtClean="0">
+                <a:solidFill>
+                  <a:schemeClr val="bg1"/>
+                </a:solidFill>
+                <a:latin typeface="+mj-lt"/>
+                <a:ea typeface="+mj-ea"/>
+                <a:cs typeface="+mj-cs"/>
+              </a:rPr>
+              <a:t>(right)</a:t>
             </a:r>
             <a:endParaRPr kumimoji="1" lang="en-US" sz="2000" dirty="0">
               <a:solidFill>
@@ -9900,10 +9955,10 @@
         </p:nvGrpSpPr>
         <p:grpSpPr bwMode="auto">
           <a:xfrm>
-            <a:off x="29565600" y="27736800"/>
-            <a:ext cx="13335000" cy="4862870"/>
-            <a:chOff x="29565600" y="13715998"/>
-            <a:chExt cx="13335000" cy="8462209"/>
+            <a:off x="29565600" y="27337645"/>
+            <a:ext cx="13335000" cy="4912023"/>
+            <a:chOff x="29565600" y="13716000"/>
+            <a:chExt cx="13335000" cy="7899344"/>
           </a:xfrm>
         </p:grpSpPr>
         <p:sp>
@@ -9969,8 +10024,8 @@
           </p:nvSpPr>
           <p:spPr bwMode="auto">
             <a:xfrm>
-              <a:off x="29565600" y="13715998"/>
-              <a:ext cx="12954000" cy="8462209"/>
+              <a:off x="29717999" y="13795046"/>
+              <a:ext cx="12801599" cy="7820298"/>
             </a:xfrm>
             <a:prstGeom prst="rect">
               <a:avLst/>
@@ -9984,7 +10039,7 @@
             </a:ln>
           </p:spPr>
           <p:txBody>
-            <a:bodyPr>
+            <a:bodyPr wrap="square">
               <a:spAutoFit/>
             </a:bodyPr>
             <a:lstStyle/>
@@ -10222,8 +10277,8 @@
         </p:nvSpPr>
         <p:spPr bwMode="auto">
           <a:xfrm>
-            <a:off x="1066800" y="10998200"/>
-            <a:ext cx="13182600" cy="21082000"/>
+            <a:off x="1066800" y="10439400"/>
+            <a:ext cx="13182600" cy="21640800"/>
           </a:xfrm>
           <a:prstGeom prst="rect">
             <a:avLst/>
@@ -10615,29 +10670,7 @@
                   <a:ea typeface="+mj-ea"/>
                   <a:cs typeface="+mj-cs"/>
                 </a:rPr>
-                <a:t>adaptive policy </a:t>
-              </a:r>
-              <a:r>
-                <a:rPr kumimoji="1" lang="en-CA" sz="3200" dirty="0" smtClean="0">
-                  <a:solidFill>
-                    <a:schemeClr val="bg1"/>
-                  </a:solidFill>
-                  <a:latin typeface="+mj-lt"/>
-                  <a:ea typeface="+mj-ea"/>
-                  <a:cs typeface="+mj-cs"/>
-                </a:rPr>
-                <a:t>that adjusts </a:t>
-              </a:r>
-              <a:r>
-                <a:rPr kumimoji="1" lang="en-CA" sz="3200" dirty="0" smtClean="0">
-                  <a:solidFill>
-                    <a:schemeClr val="bg1"/>
-                  </a:solidFill>
-                  <a:latin typeface="+mj-lt"/>
-                  <a:ea typeface="+mj-ea"/>
-                  <a:cs typeface="+mj-cs"/>
-                </a:rPr>
-                <a:t>in </a:t>
+                <a:t>adaptive policy that adjusts in </a:t>
               </a:r>
               <a:r>
                 <a:rPr kumimoji="1" lang="en-CA" sz="3200" dirty="0">
@@ -11101,7 +11134,7 @@
         </p:nvSpPr>
         <p:spPr bwMode="auto">
           <a:xfrm>
-            <a:off x="1066799" y="10968141"/>
+            <a:off x="1096357" y="10560857"/>
             <a:ext cx="13220701" cy="3631743"/>
           </a:xfrm>
           <a:prstGeom prst="rect">
@@ -12306,6 +12339,13 @@
   <p:clrMapOvr>
     <a:masterClrMapping/>
   </p:clrMapOvr>
+  <p:timing>
+    <p:tnLst>
+      <p:par>
+        <p:cTn id="1" dur="indefinite" restart="never" nodeType="tmRoot"/>
+      </p:par>
+    </p:tnLst>
+  </p:timing>
 </p:sld>
 </file>
 

</xml_diff>